<commit_message>
more theory for presentation
</commit_message>
<xml_diff>
--- a/susanedge-presentation.pptx
+++ b/susanedge-presentation.pptx
@@ -10,16 +10,19 @@
     <p:sldId id="258" r:id="rId4"/>
     <p:sldId id="270" r:id="rId5"/>
     <p:sldId id="271" r:id="rId6"/>
-    <p:sldId id="259" r:id="rId7"/>
-    <p:sldId id="264" r:id="rId8"/>
-    <p:sldId id="269" r:id="rId9"/>
-    <p:sldId id="265" r:id="rId10"/>
-    <p:sldId id="268" r:id="rId11"/>
-    <p:sldId id="267" r:id="rId12"/>
-    <p:sldId id="260" r:id="rId13"/>
-    <p:sldId id="261" r:id="rId14"/>
-    <p:sldId id="262" r:id="rId15"/>
-    <p:sldId id="263" r:id="rId16"/>
+    <p:sldId id="272" r:id="rId7"/>
+    <p:sldId id="273" r:id="rId8"/>
+    <p:sldId id="274" r:id="rId9"/>
+    <p:sldId id="259" r:id="rId10"/>
+    <p:sldId id="264" r:id="rId11"/>
+    <p:sldId id="269" r:id="rId12"/>
+    <p:sldId id="265" r:id="rId13"/>
+    <p:sldId id="268" r:id="rId14"/>
+    <p:sldId id="267" r:id="rId15"/>
+    <p:sldId id="260" r:id="rId16"/>
+    <p:sldId id="261" r:id="rId17"/>
+    <p:sldId id="262" r:id="rId18"/>
+    <p:sldId id="263" r:id="rId19"/>
   </p:sldIdLst>
   <p:sldSz cx="9144000" cy="6858000" type="screen4x3"/>
   <p:notesSz cx="6858000" cy="9144000"/>
@@ -303,7 +306,7 @@
             <a:fld id="{420D65D8-03CC-42D4-89C4-CB770DA01089}" type="datetimeFigureOut">
               <a:rPr lang="en-GB" smtClean="0"/>
               <a:pPr/>
-              <a:t>04/02/2012</a:t>
+              <a:t>05/02/2012</a:t>
             </a:fld>
             <a:endParaRPr lang="en-GB"/>
           </a:p>
@@ -355,7 +358,7 @@
     </p:spTree>
     <p:extLst>
       <p:ext uri="{BB962C8B-B14F-4D97-AF65-F5344CB8AC3E}">
-        <p14:creationId xmlns:p14="http://schemas.microsoft.com/office/powerpoint/2010/main" xmlns="" val="158945681"/>
+        <p14:creationId xmlns="" xmlns:p14="http://schemas.microsoft.com/office/powerpoint/2010/main" val="158945681"/>
       </p:ext>
     </p:extLst>
   </p:cSld>
@@ -475,7 +478,7 @@
             <a:fld id="{420D65D8-03CC-42D4-89C4-CB770DA01089}" type="datetimeFigureOut">
               <a:rPr lang="en-GB" smtClean="0"/>
               <a:pPr/>
-              <a:t>04/02/2012</a:t>
+              <a:t>05/02/2012</a:t>
             </a:fld>
             <a:endParaRPr lang="en-GB"/>
           </a:p>
@@ -527,7 +530,7 @@
     </p:spTree>
     <p:extLst>
       <p:ext uri="{BB962C8B-B14F-4D97-AF65-F5344CB8AC3E}">
-        <p14:creationId xmlns:p14="http://schemas.microsoft.com/office/powerpoint/2010/main" xmlns="" val="2097151947"/>
+        <p14:creationId xmlns="" xmlns:p14="http://schemas.microsoft.com/office/powerpoint/2010/main" val="2097151947"/>
       </p:ext>
     </p:extLst>
   </p:cSld>
@@ -657,7 +660,7 @@
             <a:fld id="{420D65D8-03CC-42D4-89C4-CB770DA01089}" type="datetimeFigureOut">
               <a:rPr lang="en-GB" smtClean="0"/>
               <a:pPr/>
-              <a:t>04/02/2012</a:t>
+              <a:t>05/02/2012</a:t>
             </a:fld>
             <a:endParaRPr lang="en-GB"/>
           </a:p>
@@ -709,7 +712,7 @@
     </p:spTree>
     <p:extLst>
       <p:ext uri="{BB962C8B-B14F-4D97-AF65-F5344CB8AC3E}">
-        <p14:creationId xmlns:p14="http://schemas.microsoft.com/office/powerpoint/2010/main" xmlns="" val="4271639342"/>
+        <p14:creationId xmlns="" xmlns:p14="http://schemas.microsoft.com/office/powerpoint/2010/main" val="4271639342"/>
       </p:ext>
     </p:extLst>
   </p:cSld>
@@ -829,7 +832,7 @@
             <a:fld id="{420D65D8-03CC-42D4-89C4-CB770DA01089}" type="datetimeFigureOut">
               <a:rPr lang="en-GB" smtClean="0"/>
               <a:pPr/>
-              <a:t>04/02/2012</a:t>
+              <a:t>05/02/2012</a:t>
             </a:fld>
             <a:endParaRPr lang="en-GB"/>
           </a:p>
@@ -881,7 +884,7 @@
     </p:spTree>
     <p:extLst>
       <p:ext uri="{BB962C8B-B14F-4D97-AF65-F5344CB8AC3E}">
-        <p14:creationId xmlns:p14="http://schemas.microsoft.com/office/powerpoint/2010/main" xmlns="" val="4219831927"/>
+        <p14:creationId xmlns="" xmlns:p14="http://schemas.microsoft.com/office/powerpoint/2010/main" val="4219831927"/>
       </p:ext>
     </p:extLst>
   </p:cSld>
@@ -1077,7 +1080,7 @@
             <a:fld id="{420D65D8-03CC-42D4-89C4-CB770DA01089}" type="datetimeFigureOut">
               <a:rPr lang="en-GB" smtClean="0"/>
               <a:pPr/>
-              <a:t>04/02/2012</a:t>
+              <a:t>05/02/2012</a:t>
             </a:fld>
             <a:endParaRPr lang="en-GB"/>
           </a:p>
@@ -1129,7 +1132,7 @@
     </p:spTree>
     <p:extLst>
       <p:ext uri="{BB962C8B-B14F-4D97-AF65-F5344CB8AC3E}">
-        <p14:creationId xmlns:p14="http://schemas.microsoft.com/office/powerpoint/2010/main" xmlns="" val="148751217"/>
+        <p14:creationId xmlns="" xmlns:p14="http://schemas.microsoft.com/office/powerpoint/2010/main" val="148751217"/>
       </p:ext>
     </p:extLst>
   </p:cSld>
@@ -1367,7 +1370,7 @@
             <a:fld id="{420D65D8-03CC-42D4-89C4-CB770DA01089}" type="datetimeFigureOut">
               <a:rPr lang="en-GB" smtClean="0"/>
               <a:pPr/>
-              <a:t>04/02/2012</a:t>
+              <a:t>05/02/2012</a:t>
             </a:fld>
             <a:endParaRPr lang="en-GB"/>
           </a:p>
@@ -1419,7 +1422,7 @@
     </p:spTree>
     <p:extLst>
       <p:ext uri="{BB962C8B-B14F-4D97-AF65-F5344CB8AC3E}">
-        <p14:creationId xmlns:p14="http://schemas.microsoft.com/office/powerpoint/2010/main" xmlns="" val="30041719"/>
+        <p14:creationId xmlns="" xmlns:p14="http://schemas.microsoft.com/office/powerpoint/2010/main" val="30041719"/>
       </p:ext>
     </p:extLst>
   </p:cSld>
@@ -1791,7 +1794,7 @@
             <a:fld id="{420D65D8-03CC-42D4-89C4-CB770DA01089}" type="datetimeFigureOut">
               <a:rPr lang="en-GB" smtClean="0"/>
               <a:pPr/>
-              <a:t>04/02/2012</a:t>
+              <a:t>05/02/2012</a:t>
             </a:fld>
             <a:endParaRPr lang="en-GB"/>
           </a:p>
@@ -1843,7 +1846,7 @@
     </p:spTree>
     <p:extLst>
       <p:ext uri="{BB962C8B-B14F-4D97-AF65-F5344CB8AC3E}">
-        <p14:creationId xmlns:p14="http://schemas.microsoft.com/office/powerpoint/2010/main" xmlns="" val="1034348362"/>
+        <p14:creationId xmlns="" xmlns:p14="http://schemas.microsoft.com/office/powerpoint/2010/main" val="1034348362"/>
       </p:ext>
     </p:extLst>
   </p:cSld>
@@ -1911,7 +1914,7 @@
             <a:fld id="{420D65D8-03CC-42D4-89C4-CB770DA01089}" type="datetimeFigureOut">
               <a:rPr lang="en-GB" smtClean="0"/>
               <a:pPr/>
-              <a:t>04/02/2012</a:t>
+              <a:t>05/02/2012</a:t>
             </a:fld>
             <a:endParaRPr lang="en-GB"/>
           </a:p>
@@ -1963,7 +1966,7 @@
     </p:spTree>
     <p:extLst>
       <p:ext uri="{BB962C8B-B14F-4D97-AF65-F5344CB8AC3E}">
-        <p14:creationId xmlns:p14="http://schemas.microsoft.com/office/powerpoint/2010/main" xmlns="" val="290425148"/>
+        <p14:creationId xmlns="" xmlns:p14="http://schemas.microsoft.com/office/powerpoint/2010/main" val="290425148"/>
       </p:ext>
     </p:extLst>
   </p:cSld>
@@ -2008,7 +2011,7 @@
             <a:fld id="{420D65D8-03CC-42D4-89C4-CB770DA01089}" type="datetimeFigureOut">
               <a:rPr lang="en-GB" smtClean="0"/>
               <a:pPr/>
-              <a:t>04/02/2012</a:t>
+              <a:t>05/02/2012</a:t>
             </a:fld>
             <a:endParaRPr lang="en-GB"/>
           </a:p>
@@ -2060,7 +2063,7 @@
     </p:spTree>
     <p:extLst>
       <p:ext uri="{BB962C8B-B14F-4D97-AF65-F5344CB8AC3E}">
-        <p14:creationId xmlns:p14="http://schemas.microsoft.com/office/powerpoint/2010/main" xmlns="" val="182345889"/>
+        <p14:creationId xmlns="" xmlns:p14="http://schemas.microsoft.com/office/powerpoint/2010/main" val="182345889"/>
       </p:ext>
     </p:extLst>
   </p:cSld>
@@ -2287,7 +2290,7 @@
             <a:fld id="{420D65D8-03CC-42D4-89C4-CB770DA01089}" type="datetimeFigureOut">
               <a:rPr lang="en-GB" smtClean="0"/>
               <a:pPr/>
-              <a:t>04/02/2012</a:t>
+              <a:t>05/02/2012</a:t>
             </a:fld>
             <a:endParaRPr lang="en-GB"/>
           </a:p>
@@ -2339,7 +2342,7 @@
     </p:spTree>
     <p:extLst>
       <p:ext uri="{BB962C8B-B14F-4D97-AF65-F5344CB8AC3E}">
-        <p14:creationId xmlns:p14="http://schemas.microsoft.com/office/powerpoint/2010/main" xmlns="" val="2186173485"/>
+        <p14:creationId xmlns="" xmlns:p14="http://schemas.microsoft.com/office/powerpoint/2010/main" val="2186173485"/>
       </p:ext>
     </p:extLst>
   </p:cSld>
@@ -2542,7 +2545,7 @@
             <a:fld id="{420D65D8-03CC-42D4-89C4-CB770DA01089}" type="datetimeFigureOut">
               <a:rPr lang="en-GB" smtClean="0"/>
               <a:pPr/>
-              <a:t>04/02/2012</a:t>
+              <a:t>05/02/2012</a:t>
             </a:fld>
             <a:endParaRPr lang="en-GB"/>
           </a:p>
@@ -2594,7 +2597,7 @@
     </p:spTree>
     <p:extLst>
       <p:ext uri="{BB962C8B-B14F-4D97-AF65-F5344CB8AC3E}">
-        <p14:creationId xmlns:p14="http://schemas.microsoft.com/office/powerpoint/2010/main" xmlns="" val="4028586268"/>
+        <p14:creationId xmlns="" xmlns:p14="http://schemas.microsoft.com/office/powerpoint/2010/main" val="4028586268"/>
       </p:ext>
     </p:extLst>
   </p:cSld>
@@ -2757,7 +2760,7 @@
             <a:fld id="{420D65D8-03CC-42D4-89C4-CB770DA01089}" type="datetimeFigureOut">
               <a:rPr lang="en-GB" smtClean="0"/>
               <a:pPr/>
-              <a:t>04/02/2012</a:t>
+              <a:t>05/02/2012</a:t>
             </a:fld>
             <a:endParaRPr lang="en-GB"/>
           </a:p>
@@ -2845,7 +2848,7 @@
     </p:spTree>
     <p:extLst>
       <p:ext uri="{BB962C8B-B14F-4D97-AF65-F5344CB8AC3E}">
-        <p14:creationId xmlns:p14="http://schemas.microsoft.com/office/powerpoint/2010/main" xmlns="" val="2046728892"/>
+        <p14:creationId xmlns="" xmlns:p14="http://schemas.microsoft.com/office/powerpoint/2010/main" val="2046728892"/>
       </p:ext>
     </p:extLst>
   </p:cSld>
@@ -3188,7 +3191,7 @@
     </p:spTree>
     <p:extLst>
       <p:ext uri="{BB962C8B-B14F-4D97-AF65-F5344CB8AC3E}">
-        <p14:creationId xmlns:p14="http://schemas.microsoft.com/office/powerpoint/2010/main" xmlns="" val="1771199691"/>
+        <p14:creationId xmlns="" xmlns:p14="http://schemas.microsoft.com/office/powerpoint/2010/main" val="1771199691"/>
       </p:ext>
     </p:extLst>
   </p:cSld>
@@ -3239,7 +3242,7 @@
           <a:p>
             <a:r>
               <a:rPr lang="en-GB" dirty="0" smtClean="0"/>
-              <a:t>Implementation – Achievements</a:t>
+              <a:t>Implementation – Overview</a:t>
             </a:r>
             <a:endParaRPr lang="en-GB" dirty="0"/>
           </a:p>
@@ -3258,74 +3261,143 @@
         <p:spPr>
           <a:xfrm>
             <a:off x="457200" y="1600201"/>
-            <a:ext cx="8229600" cy="748680"/>
+            <a:ext cx="8229600" cy="676672"/>
           </a:xfrm>
         </p:spPr>
         <p:txBody>
           <a:bodyPr/>
           <a:lstStyle/>
           <a:p>
-            <a:pPr marL="514350" indent="-514350">
-              <a:buFont typeface="+mj-lt"/>
-              <a:buAutoNum type="arabicPeriod" startAt="2"/>
+            <a:r>
+              <a:rPr lang="en-GB" b="1" dirty="0" smtClean="0"/>
+              <a:t>Python</a:t>
+            </a:r>
+            <a:r>
+              <a:rPr lang="en-GB" dirty="0" smtClean="0"/>
+              <a:t> with </a:t>
+            </a:r>
+            <a:r>
+              <a:rPr lang="en-GB" dirty="0" err="1" smtClean="0"/>
+              <a:t>Numpy</a:t>
+            </a:r>
+            <a:r>
+              <a:rPr lang="en-GB" dirty="0" smtClean="0"/>
+              <a:t> and </a:t>
+            </a:r>
+            <a:r>
+              <a:rPr lang="en-GB" dirty="0" err="1" smtClean="0"/>
+              <a:t>Matplotlib</a:t>
+            </a:r>
+            <a:endParaRPr lang="en-GB" dirty="0"/>
+          </a:p>
+        </p:txBody>
+      </p:sp>
+      <p:sp>
+        <p:nvSpPr>
+          <p:cNvPr id="4" name="Rectangle 3"/>
+          <p:cNvSpPr/>
+          <p:nvPr/>
+        </p:nvSpPr>
+        <p:spPr>
+          <a:xfrm>
+            <a:off x="65076" y="6304002"/>
+            <a:ext cx="8928992" cy="553998"/>
+          </a:xfrm>
+          <a:prstGeom prst="rect">
+            <a:avLst/>
+          </a:prstGeom>
+        </p:spPr>
+        <p:txBody>
+          <a:bodyPr wrap="square">
+            <a:spAutoFit/>
+          </a:bodyPr>
+          <a:lstStyle/>
+          <a:p>
+            <a:r>
+              <a:rPr lang="en-GB" sz="1000" dirty="0" smtClean="0"/>
+              <a:t>Images:</a:t>
+            </a:r>
+          </a:p>
+          <a:p>
+            <a:pPr marL="171450" indent="-171450">
+              <a:buFont typeface="Arial" pitchFamily="34" charset="0"/>
+              <a:buChar char="•"/>
             </a:pPr>
             <a:r>
-              <a:rPr lang="en-GB" dirty="0" smtClean="0"/>
-              <a:t> </a:t>
-            </a:r>
-            <a:r>
-              <a:rPr lang="en-GB" b="1" dirty="0" smtClean="0"/>
-              <a:t>Smoothed </a:t>
-            </a:r>
-            <a:r>
-              <a:rPr lang="en-GB" dirty="0" smtClean="0"/>
-              <a:t>similarity equation implemented</a:t>
-            </a:r>
+              <a:rPr lang="en-GB" sz="1000" dirty="0" smtClean="0"/>
+              <a:t>http://urania.udea.edu.co/sites/astronomia-2.0/pages/descargas.rs/files/descargasdt5vi/Cursos/CursosElectivos/FisicaAstrofisicaComputacional/2009-2/Documentacion/matplotlib/examples/pylab_examples/quiver_demo.html </a:t>
+            </a:r>
+            <a:endParaRPr lang="en-GB" sz="1000" dirty="0"/>
           </a:p>
         </p:txBody>
       </p:sp>
       <p:pic>
         <p:nvPicPr>
-          <p:cNvPr id="3074" name="Picture 2" descr="H:\susanedge\susanedge\figures\smooth_square_susan_test.png"/>
+          <p:cNvPr id="1027" name="Picture 3"/>
           <p:cNvPicPr>
             <a:picLocks noChangeAspect="1" noChangeArrowheads="1"/>
           </p:cNvPicPr>
           <p:nvPr/>
         </p:nvPicPr>
-        <p:blipFill rotWithShape="1">
+        <p:blipFill>
           <a:blip r:embed="rId2" cstate="print">
             <a:extLst>
               <a:ext uri="{28A0092B-C50C-407E-A947-70E740481C1C}">
-                <a14:useLocalDpi xmlns:a14="http://schemas.microsoft.com/office/drawing/2010/main" xmlns="" val="0"/>
+                <a14:useLocalDpi xmlns="" xmlns:a14="http://schemas.microsoft.com/office/drawing/2010/main" val="0"/>
               </a:ext>
             </a:extLst>
           </a:blip>
-          <a:srcRect l="28299" t="8238" r="28038" b="7052"/>
-          <a:stretch/>
+          <a:srcRect/>
+          <a:stretch>
+            <a:fillRect/>
+          </a:stretch>
         </p:blipFill>
         <p:spPr bwMode="auto">
           <a:xfrm>
-            <a:off x="4211960" y="2204864"/>
-            <a:ext cx="4651848" cy="4540870"/>
+            <a:off x="3419872" y="2200425"/>
+            <a:ext cx="2448272" cy="2003132"/>
           </a:xfrm>
           <a:prstGeom prst="rect">
             <a:avLst/>
           </a:prstGeom>
           <a:noFill/>
+          <a:ln>
+            <a:noFill/>
+          </a:ln>
+          <a:effectLst/>
           <a:extLst>
             <a:ext uri="{909E8E84-426E-40DD-AFC4-6F175D3DCCD1}">
-              <a14:hiddenFill xmlns:a14="http://schemas.microsoft.com/office/drawing/2010/main" xmlns="">
+              <a14:hiddenFill xmlns="" xmlns:a14="http://schemas.microsoft.com/office/drawing/2010/main">
                 <a:solidFill>
-                  <a:srgbClr val="FFFFFF"/>
+                  <a:schemeClr val="accent1"/>
                 </a:solidFill>
               </a14:hiddenFill>
+            </a:ext>
+            <a:ext uri="{91240B29-F687-4F45-9708-019B960494DF}">
+              <a14:hiddenLine xmlns="" xmlns:a14="http://schemas.microsoft.com/office/drawing/2010/main" w="9525">
+                <a:solidFill>
+                  <a:schemeClr val="tx1"/>
+                </a:solidFill>
+                <a:miter lim="800000"/>
+                <a:headEnd/>
+                <a:tailEnd/>
+              </a14:hiddenLine>
+            </a:ext>
+            <a:ext uri="{AF507438-7753-43E0-B8FC-AC1667EBCBE1}">
+              <a14:hiddenEffects xmlns="" xmlns:a14="http://schemas.microsoft.com/office/drawing/2010/main">
+                <a:effectLst>
+                  <a:outerShdw dist="35921" dir="2700000" algn="ctr" rotWithShape="0">
+                    <a:schemeClr val="bg2"/>
+                  </a:outerShdw>
+                </a:effectLst>
+              </a14:hiddenEffects>
             </a:ext>
           </a:extLst>
         </p:spPr>
       </p:pic>
       <p:sp>
         <p:nvSpPr>
-          <p:cNvPr id="5" name="Content Placeholder 2"/>
+          <p:cNvPr id="7" name="Content Placeholder 2"/>
           <p:cNvSpPr txBox="1">
             <a:spLocks/>
           </p:cNvSpPr>
@@ -3333,8 +3405,8 @@
         </p:nvSpPr>
         <p:spPr>
           <a:xfrm>
-            <a:off x="467544" y="2276872"/>
-            <a:ext cx="3888432" cy="2808312"/>
+            <a:off x="446856" y="4264496"/>
+            <a:ext cx="8229600" cy="676672"/>
           </a:xfrm>
           <a:prstGeom prst="rect">
             <a:avLst/>
@@ -3482,21 +3554,17 @@
             </a:lvl9pPr>
           </a:lstStyle>
           <a:p>
-            <a:pPr marL="514350" indent="-514350">
-              <a:buFont typeface="+mj-lt"/>
-              <a:buAutoNum type="arabicPeriod" startAt="3"/>
-            </a:pPr>
             <a:r>
               <a:rPr lang="en-GB" dirty="0" smtClean="0"/>
-              <a:t>Algorithm </a:t>
-            </a:r>
-            <a:r>
-              <a:rPr lang="en-GB" dirty="0" err="1" smtClean="0"/>
-              <a:t>vectorised</a:t>
+              <a:t>Slow </a:t>
+            </a:r>
+            <a:r>
+              <a:rPr lang="en-GB" b="1" dirty="0" smtClean="0"/>
+              <a:t>pixel loop</a:t>
             </a:r>
             <a:r>
               <a:rPr lang="en-GB" dirty="0" smtClean="0"/>
-              <a:t> to improve speed</a:t>
+              <a:t> implementation</a:t>
             </a:r>
             <a:endParaRPr lang="en-GB" dirty="0"/>
           </a:p>
@@ -3505,7 +3573,7 @@
     </p:spTree>
     <p:extLst>
       <p:ext uri="{BB962C8B-B14F-4D97-AF65-F5344CB8AC3E}">
-        <p14:creationId xmlns:p14="http://schemas.microsoft.com/office/powerpoint/2010/main" xmlns="" val="3107077440"/>
+        <p14:creationId xmlns="" xmlns:p14="http://schemas.microsoft.com/office/powerpoint/2010/main" val="4186463740"/>
       </p:ext>
     </p:extLst>
   </p:cSld>
@@ -3577,142 +3645,18 @@
           <a:bodyPr/>
           <a:lstStyle/>
           <a:p>
-            <a:pPr marL="514350" indent="-514350">
-              <a:buFont typeface="+mj-lt"/>
-              <a:buAutoNum type="arabicPeriod"/>
-            </a:pPr>
             <a:r>
               <a:rPr lang="en-GB" dirty="0" smtClean="0"/>
-              <a:t>Implementation with </a:t>
+              <a:t>Took </a:t>
             </a:r>
             <a:r>
               <a:rPr lang="en-GB" b="1" dirty="0" smtClean="0"/>
-              <a:t>square mask </a:t>
+              <a:t>iterative</a:t>
             </a:r>
             <a:r>
               <a:rPr lang="en-GB" dirty="0" smtClean="0"/>
-              <a:t>and </a:t>
-            </a:r>
-            <a:r>
-              <a:rPr lang="en-GB" b="1" dirty="0" smtClean="0"/>
-              <a:t>simple</a:t>
-            </a:r>
-            <a:r>
-              <a:rPr lang="en-GB" dirty="0" smtClean="0"/>
-              <a:t>  </a:t>
-            </a:r>
-            <a:r>
-              <a:rPr lang="en-GB" b="1" dirty="0" smtClean="0"/>
-              <a:t>similarity equation</a:t>
-            </a:r>
-          </a:p>
-          <a:p>
-            <a:pPr marL="571500" indent="-514350">
-              <a:buFont typeface="+mj-lt"/>
-              <a:buAutoNum type="arabicPeriod"/>
-            </a:pPr>
-            <a:r>
-              <a:rPr lang="en-GB" dirty="0" smtClean="0"/>
-              <a:t> </a:t>
-            </a:r>
-            <a:r>
-              <a:rPr lang="en-GB" b="1" dirty="0" smtClean="0"/>
-              <a:t>Smoothed </a:t>
-            </a:r>
-            <a:r>
-              <a:rPr lang="en-GB" dirty="0" smtClean="0"/>
-              <a:t>similarity equation implemented</a:t>
-            </a:r>
-          </a:p>
-          <a:p>
-            <a:pPr marL="571500" indent="-514350">
-              <a:buFont typeface="+mj-lt"/>
-              <a:buAutoNum type="arabicPeriod"/>
-            </a:pPr>
-            <a:r>
-              <a:rPr lang="en-GB" dirty="0" smtClean="0"/>
-              <a:t> </a:t>
-            </a:r>
-            <a:r>
-              <a:rPr lang="en-GB" b="1" dirty="0" smtClean="0"/>
-              <a:t>Circular</a:t>
-            </a:r>
-            <a:r>
-              <a:rPr lang="en-GB" dirty="0" smtClean="0"/>
-              <a:t> mask implemented</a:t>
-            </a:r>
-          </a:p>
-          <a:p>
-            <a:pPr marL="571500" indent="-514350">
-              <a:buFont typeface="+mj-lt"/>
-              <a:buAutoNum type="arabicPeriod"/>
-            </a:pPr>
-            <a:r>
-              <a:rPr lang="en-GB" dirty="0"/>
-              <a:t>  </a:t>
-            </a:r>
-            <a:r>
-              <a:rPr lang="en-GB" b="1" dirty="0" smtClean="0"/>
-              <a:t>Inter</a:t>
-            </a:r>
-            <a:r>
-              <a:rPr lang="en-GB" dirty="0" smtClean="0"/>
-              <a:t>-Pixel </a:t>
-            </a:r>
-            <a:r>
-              <a:rPr lang="en-GB" b="1" dirty="0" smtClean="0"/>
-              <a:t>edge direction</a:t>
-            </a:r>
-            <a:r>
-              <a:rPr lang="en-GB" dirty="0" smtClean="0"/>
-              <a:t> measurement implemented</a:t>
-            </a:r>
-          </a:p>
-          <a:p>
-            <a:pPr marL="571500" indent="-514350">
-              <a:buFont typeface="+mj-lt"/>
-              <a:buAutoNum type="arabicPeriod"/>
-            </a:pPr>
-            <a:r>
-              <a:rPr lang="en-GB" dirty="0" smtClean="0"/>
-              <a:t> </a:t>
-            </a:r>
-            <a:r>
-              <a:rPr lang="en-GB" b="1" dirty="0" smtClean="0"/>
-              <a:t>Intra</a:t>
-            </a:r>
-            <a:r>
-              <a:rPr lang="en-GB" dirty="0" smtClean="0"/>
-              <a:t>-Pixel </a:t>
-            </a:r>
-            <a:r>
-              <a:rPr lang="en-GB" b="1" dirty="0" smtClean="0"/>
-              <a:t>edge direction</a:t>
-            </a:r>
-            <a:r>
-              <a:rPr lang="en-GB" dirty="0" smtClean="0"/>
-              <a:t> measurement implemented</a:t>
-            </a:r>
-          </a:p>
-          <a:p>
-            <a:pPr marL="971550" lvl="1" indent="-514350">
-              <a:buFont typeface="+mj-lt"/>
-              <a:buAutoNum type="arabicPeriod"/>
-            </a:pPr>
-            <a:endParaRPr lang="en-GB" dirty="0" smtClean="0"/>
-          </a:p>
-          <a:p>
-            <a:pPr marL="971550" lvl="1" indent="-514350">
-              <a:buFont typeface="+mj-lt"/>
-              <a:buAutoNum type="arabicPeriod"/>
-            </a:pPr>
-            <a:endParaRPr lang="en-GB" dirty="0" smtClean="0"/>
-          </a:p>
-          <a:p>
-            <a:pPr marL="971550" lvl="1" indent="-514350">
-              <a:buFont typeface="+mj-lt"/>
-              <a:buAutoNum type="arabicPeriod"/>
-            </a:pPr>
+              <a:t> approach to implementation</a:t>
+            </a:r>
             <a:endParaRPr lang="en-GB" dirty="0"/>
           </a:p>
         </p:txBody>
@@ -3720,7 +3664,7 @@
     </p:spTree>
     <p:extLst>
       <p:ext uri="{BB962C8B-B14F-4D97-AF65-F5344CB8AC3E}">
-        <p14:creationId xmlns:p14="http://schemas.microsoft.com/office/powerpoint/2010/main" xmlns="" val="543308162"/>
+        <p14:creationId xmlns="" xmlns:p14="http://schemas.microsoft.com/office/powerpoint/2010/main" val="1216218812"/>
       </p:ext>
     </p:extLst>
   </p:cSld>
@@ -3756,12 +3700,12 @@
       </p:grpSpPr>
       <p:sp>
         <p:nvSpPr>
-          <p:cNvPr id="6" name="Title 5"/>
-          <p:cNvSpPr>
-            <a:spLocks noGrp="1"/>
-          </p:cNvSpPr>
-          <p:nvPr>
-            <p:ph type="ctrTitle"/>
+          <p:cNvPr id="2" name="Title 1"/>
+          <p:cNvSpPr>
+            <a:spLocks noGrp="1"/>
+          </p:cNvSpPr>
+          <p:nvPr>
+            <p:ph type="title"/>
           </p:nvPr>
         </p:nvSpPr>
         <p:spPr/>
@@ -3771,7 +3715,7 @@
           <a:p>
             <a:r>
               <a:rPr lang="en-GB" dirty="0" smtClean="0"/>
-              <a:t>Demo</a:t>
+              <a:t>Implementation – Achievements</a:t>
             </a:r>
             <a:endParaRPr lang="en-GB" dirty="0"/>
           </a:p>
@@ -3779,12 +3723,12 @@
       </p:sp>
       <p:sp>
         <p:nvSpPr>
-          <p:cNvPr id="8" name="Subtitle 7"/>
-          <p:cNvSpPr>
-            <a:spLocks noGrp="1"/>
-          </p:cNvSpPr>
-          <p:nvPr>
-            <p:ph type="subTitle" idx="1"/>
+          <p:cNvPr id="3" name="Content Placeholder 2"/>
+          <p:cNvSpPr>
+            <a:spLocks noGrp="1"/>
+          </p:cNvSpPr>
+          <p:nvPr>
+            <p:ph idx="1"/>
           </p:nvPr>
         </p:nvSpPr>
         <p:spPr/>
@@ -3792,14 +3736,95 @@
           <a:bodyPr/>
           <a:lstStyle/>
           <a:p>
+            <a:pPr marL="514350" indent="-514350">
+              <a:buFont typeface="+mj-lt"/>
+              <a:buAutoNum type="arabicPeriod"/>
+            </a:pPr>
+            <a:r>
+              <a:rPr lang="en-GB" dirty="0" smtClean="0"/>
+              <a:t>Implementation with </a:t>
+            </a:r>
+            <a:r>
+              <a:rPr lang="en-GB" b="1" dirty="0" smtClean="0"/>
+              <a:t>square mask </a:t>
+            </a:r>
+            <a:r>
+              <a:rPr lang="en-GB" dirty="0" smtClean="0"/>
+              <a:t>and </a:t>
+            </a:r>
+            <a:r>
+              <a:rPr lang="en-GB" b="1" dirty="0" smtClean="0"/>
+              <a:t>simple</a:t>
+            </a:r>
+            <a:r>
+              <a:rPr lang="en-GB" dirty="0" smtClean="0"/>
+              <a:t>  </a:t>
+            </a:r>
+            <a:r>
+              <a:rPr lang="en-GB" b="1" dirty="0" smtClean="0"/>
+              <a:t>similarity equation</a:t>
+            </a:r>
+            <a:endParaRPr lang="en-GB" dirty="0" smtClean="0"/>
+          </a:p>
+          <a:p>
+            <a:pPr marL="971550" lvl="1" indent="-514350">
+              <a:buFont typeface="+mj-lt"/>
+              <a:buAutoNum type="arabicPeriod"/>
+            </a:pPr>
+            <a:endParaRPr lang="en-GB" dirty="0" smtClean="0"/>
+          </a:p>
+          <a:p>
+            <a:pPr marL="971550" lvl="1" indent="-514350">
+              <a:buFont typeface="+mj-lt"/>
+              <a:buAutoNum type="arabicPeriod"/>
+            </a:pPr>
             <a:endParaRPr lang="en-GB" dirty="0"/>
           </a:p>
         </p:txBody>
       </p:sp>
+      <p:pic>
+        <p:nvPicPr>
+          <p:cNvPr id="2050" name="Picture 2" descr="H:\susanedge\susanedge\figures\simple_square_susan_test.png"/>
+          <p:cNvPicPr>
+            <a:picLocks noChangeAspect="1" noChangeArrowheads="1"/>
+          </p:cNvPicPr>
+          <p:nvPr/>
+        </p:nvPicPr>
+        <p:blipFill rotWithShape="1">
+          <a:blip r:embed="rId2" cstate="print">
+            <a:extLst>
+              <a:ext uri="{28A0092B-C50C-407E-A947-70E740481C1C}">
+                <a14:useLocalDpi xmlns="" xmlns:a14="http://schemas.microsoft.com/office/drawing/2010/main" val="0"/>
+              </a:ext>
+            </a:extLst>
+          </a:blip>
+          <a:srcRect l="28643" t="7158" r="27869" b="6235"/>
+          <a:stretch/>
+        </p:blipFill>
+        <p:spPr bwMode="auto">
+          <a:xfrm>
+            <a:off x="2699792" y="2676252"/>
+            <a:ext cx="3798350" cy="3805932"/>
+          </a:xfrm>
+          <a:prstGeom prst="rect">
+            <a:avLst/>
+          </a:prstGeom>
+          <a:noFill/>
+          <a:extLst>
+            <a:ext uri="{909E8E84-426E-40DD-AFC4-6F175D3DCCD1}">
+              <a14:hiddenFill xmlns="" xmlns:a14="http://schemas.microsoft.com/office/drawing/2010/main">
+                <a:solidFill>
+                  <a:srgbClr val="FFFFFF"/>
+                </a:solidFill>
+              </a14:hiddenFill>
+            </a:ext>
+          </a:extLst>
+        </p:spPr>
+      </p:pic>
     </p:spTree>
     <p:extLst>
       <p:ext uri="{BB962C8B-B14F-4D97-AF65-F5344CB8AC3E}">
-        <p14:creationId xmlns:p14="http://schemas.microsoft.com/office/powerpoint/2010/main" xmlns="" val="2001286214"/>
+        <p14:creationId xmlns="" xmlns:p14="http://schemas.microsoft.com/office/powerpoint/2010/main" val="1537013682"/>
       </p:ext>
     </p:extLst>
   </p:cSld>
@@ -3840,7 +3865,7 @@
             <a:spLocks noGrp="1"/>
           </p:cNvSpPr>
           <p:nvPr>
-            <p:ph type="ctrTitle"/>
+            <p:ph type="title"/>
           </p:nvPr>
         </p:nvSpPr>
         <p:spPr/>
@@ -3850,7 +3875,7 @@
           <a:p>
             <a:r>
               <a:rPr lang="en-GB" dirty="0" smtClean="0"/>
-              <a:t>Experimentation</a:t>
+              <a:t>Implementation – Achievements</a:t>
             </a:r>
             <a:endParaRPr lang="en-GB" dirty="0"/>
           </a:p>
@@ -3858,27 +3883,265 @@
       </p:sp>
       <p:sp>
         <p:nvSpPr>
-          <p:cNvPr id="4" name="Subtitle 3"/>
-          <p:cNvSpPr>
-            <a:spLocks noGrp="1"/>
-          </p:cNvSpPr>
-          <p:nvPr>
-            <p:ph type="subTitle" idx="1"/>
-          </p:nvPr>
-        </p:nvSpPr>
-        <p:spPr/>
-        <p:txBody>
-          <a:bodyPr/>
-          <a:lstStyle/>
-          <a:p>
-            <a:endParaRPr lang="en-GB"/>
+          <p:cNvPr id="3" name="Content Placeholder 2"/>
+          <p:cNvSpPr>
+            <a:spLocks noGrp="1"/>
+          </p:cNvSpPr>
+          <p:nvPr>
+            <p:ph idx="1"/>
+          </p:nvPr>
+        </p:nvSpPr>
+        <p:spPr>
+          <a:xfrm>
+            <a:off x="457200" y="1600201"/>
+            <a:ext cx="8229600" cy="748680"/>
+          </a:xfrm>
+        </p:spPr>
+        <p:txBody>
+          <a:bodyPr/>
+          <a:lstStyle/>
+          <a:p>
+            <a:pPr marL="514350" indent="-514350">
+              <a:buFont typeface="+mj-lt"/>
+              <a:buAutoNum type="arabicPeriod" startAt="2"/>
+            </a:pPr>
+            <a:r>
+              <a:rPr lang="en-GB" dirty="0" smtClean="0"/>
+              <a:t> </a:t>
+            </a:r>
+            <a:r>
+              <a:rPr lang="en-GB" b="1" dirty="0" smtClean="0"/>
+              <a:t>Smoothed </a:t>
+            </a:r>
+            <a:r>
+              <a:rPr lang="en-GB" dirty="0" smtClean="0"/>
+              <a:t>similarity equation implemented</a:t>
+            </a:r>
+          </a:p>
+        </p:txBody>
+      </p:sp>
+      <p:pic>
+        <p:nvPicPr>
+          <p:cNvPr id="3074" name="Picture 2" descr="H:\susanedge\susanedge\figures\smooth_square_susan_test.png"/>
+          <p:cNvPicPr>
+            <a:picLocks noChangeAspect="1" noChangeArrowheads="1"/>
+          </p:cNvPicPr>
+          <p:nvPr/>
+        </p:nvPicPr>
+        <p:blipFill rotWithShape="1">
+          <a:blip r:embed="rId2" cstate="print">
+            <a:extLst>
+              <a:ext uri="{28A0092B-C50C-407E-A947-70E740481C1C}">
+                <a14:useLocalDpi xmlns="" xmlns:a14="http://schemas.microsoft.com/office/drawing/2010/main" val="0"/>
+              </a:ext>
+            </a:extLst>
+          </a:blip>
+          <a:srcRect l="28299" t="8238" r="28038" b="7052"/>
+          <a:stretch/>
+        </p:blipFill>
+        <p:spPr bwMode="auto">
+          <a:xfrm>
+            <a:off x="4211960" y="2204864"/>
+            <a:ext cx="4651848" cy="4540870"/>
+          </a:xfrm>
+          <a:prstGeom prst="rect">
+            <a:avLst/>
+          </a:prstGeom>
+          <a:noFill/>
+          <a:extLst>
+            <a:ext uri="{909E8E84-426E-40DD-AFC4-6F175D3DCCD1}">
+              <a14:hiddenFill xmlns="" xmlns:a14="http://schemas.microsoft.com/office/drawing/2010/main">
+                <a:solidFill>
+                  <a:srgbClr val="FFFFFF"/>
+                </a:solidFill>
+              </a14:hiddenFill>
+            </a:ext>
+          </a:extLst>
+        </p:spPr>
+      </p:pic>
+      <p:sp>
+        <p:nvSpPr>
+          <p:cNvPr id="5" name="Content Placeholder 2"/>
+          <p:cNvSpPr txBox="1">
+            <a:spLocks/>
+          </p:cNvSpPr>
+          <p:nvPr/>
+        </p:nvSpPr>
+        <p:spPr>
+          <a:xfrm>
+            <a:off x="467544" y="2276872"/>
+            <a:ext cx="3888432" cy="2808312"/>
+          </a:xfrm>
+          <a:prstGeom prst="rect">
+            <a:avLst/>
+          </a:prstGeom>
+        </p:spPr>
+        <p:txBody>
+          <a:bodyPr vert="horz" lIns="91440" tIns="45720" rIns="91440" bIns="45720" rtlCol="0">
+            <a:normAutofit/>
+          </a:bodyPr>
+          <a:lstStyle>
+            <a:lvl1pPr marL="342900" indent="-342900" algn="l" defTabSz="914400" rtl="0" eaLnBrk="1" latinLnBrk="0" hangingPunct="1">
+              <a:spcBef>
+                <a:spcPct val="20000"/>
+              </a:spcBef>
+              <a:buFont typeface="Arial" pitchFamily="34" charset="0"/>
+              <a:buChar char="•"/>
+              <a:defRPr sz="3200" kern="1200">
+                <a:solidFill>
+                  <a:schemeClr val="tx1"/>
+                </a:solidFill>
+                <a:latin typeface="+mn-lt"/>
+                <a:ea typeface="+mn-ea"/>
+                <a:cs typeface="+mn-cs"/>
+              </a:defRPr>
+            </a:lvl1pPr>
+            <a:lvl2pPr marL="742950" indent="-285750" algn="l" defTabSz="914400" rtl="0" eaLnBrk="1" latinLnBrk="0" hangingPunct="1">
+              <a:spcBef>
+                <a:spcPct val="20000"/>
+              </a:spcBef>
+              <a:buFont typeface="Arial" pitchFamily="34" charset="0"/>
+              <a:buChar char="–"/>
+              <a:defRPr sz="2800" kern="1200">
+                <a:solidFill>
+                  <a:schemeClr val="tx1"/>
+                </a:solidFill>
+                <a:latin typeface="+mn-lt"/>
+                <a:ea typeface="+mn-ea"/>
+                <a:cs typeface="+mn-cs"/>
+              </a:defRPr>
+            </a:lvl2pPr>
+            <a:lvl3pPr marL="1143000" indent="-228600" algn="l" defTabSz="914400" rtl="0" eaLnBrk="1" latinLnBrk="0" hangingPunct="1">
+              <a:spcBef>
+                <a:spcPct val="20000"/>
+              </a:spcBef>
+              <a:buFont typeface="Arial" pitchFamily="34" charset="0"/>
+              <a:buChar char="•"/>
+              <a:defRPr sz="2400" kern="1200">
+                <a:solidFill>
+                  <a:schemeClr val="tx1"/>
+                </a:solidFill>
+                <a:latin typeface="+mn-lt"/>
+                <a:ea typeface="+mn-ea"/>
+                <a:cs typeface="+mn-cs"/>
+              </a:defRPr>
+            </a:lvl3pPr>
+            <a:lvl4pPr marL="1600200" indent="-228600" algn="l" defTabSz="914400" rtl="0" eaLnBrk="1" latinLnBrk="0" hangingPunct="1">
+              <a:spcBef>
+                <a:spcPct val="20000"/>
+              </a:spcBef>
+              <a:buFont typeface="Arial" pitchFamily="34" charset="0"/>
+              <a:buChar char="–"/>
+              <a:defRPr sz="2000" kern="1200">
+                <a:solidFill>
+                  <a:schemeClr val="tx1"/>
+                </a:solidFill>
+                <a:latin typeface="+mn-lt"/>
+                <a:ea typeface="+mn-ea"/>
+                <a:cs typeface="+mn-cs"/>
+              </a:defRPr>
+            </a:lvl4pPr>
+            <a:lvl5pPr marL="2057400" indent="-228600" algn="l" defTabSz="914400" rtl="0" eaLnBrk="1" latinLnBrk="0" hangingPunct="1">
+              <a:spcBef>
+                <a:spcPct val="20000"/>
+              </a:spcBef>
+              <a:buFont typeface="Arial" pitchFamily="34" charset="0"/>
+              <a:buChar char="»"/>
+              <a:defRPr sz="2000" kern="1200">
+                <a:solidFill>
+                  <a:schemeClr val="tx1"/>
+                </a:solidFill>
+                <a:latin typeface="+mn-lt"/>
+                <a:ea typeface="+mn-ea"/>
+                <a:cs typeface="+mn-cs"/>
+              </a:defRPr>
+            </a:lvl5pPr>
+            <a:lvl6pPr marL="2514600" indent="-228600" algn="l" defTabSz="914400" rtl="0" eaLnBrk="1" latinLnBrk="0" hangingPunct="1">
+              <a:spcBef>
+                <a:spcPct val="20000"/>
+              </a:spcBef>
+              <a:buFont typeface="Arial" pitchFamily="34" charset="0"/>
+              <a:buChar char="•"/>
+              <a:defRPr sz="2000" kern="1200">
+                <a:solidFill>
+                  <a:schemeClr val="tx1"/>
+                </a:solidFill>
+                <a:latin typeface="+mn-lt"/>
+                <a:ea typeface="+mn-ea"/>
+                <a:cs typeface="+mn-cs"/>
+              </a:defRPr>
+            </a:lvl6pPr>
+            <a:lvl7pPr marL="2971800" indent="-228600" algn="l" defTabSz="914400" rtl="0" eaLnBrk="1" latinLnBrk="0" hangingPunct="1">
+              <a:spcBef>
+                <a:spcPct val="20000"/>
+              </a:spcBef>
+              <a:buFont typeface="Arial" pitchFamily="34" charset="0"/>
+              <a:buChar char="•"/>
+              <a:defRPr sz="2000" kern="1200">
+                <a:solidFill>
+                  <a:schemeClr val="tx1"/>
+                </a:solidFill>
+                <a:latin typeface="+mn-lt"/>
+                <a:ea typeface="+mn-ea"/>
+                <a:cs typeface="+mn-cs"/>
+              </a:defRPr>
+            </a:lvl7pPr>
+            <a:lvl8pPr marL="3429000" indent="-228600" algn="l" defTabSz="914400" rtl="0" eaLnBrk="1" latinLnBrk="0" hangingPunct="1">
+              <a:spcBef>
+                <a:spcPct val="20000"/>
+              </a:spcBef>
+              <a:buFont typeface="Arial" pitchFamily="34" charset="0"/>
+              <a:buChar char="•"/>
+              <a:defRPr sz="2000" kern="1200">
+                <a:solidFill>
+                  <a:schemeClr val="tx1"/>
+                </a:solidFill>
+                <a:latin typeface="+mn-lt"/>
+                <a:ea typeface="+mn-ea"/>
+                <a:cs typeface="+mn-cs"/>
+              </a:defRPr>
+            </a:lvl8pPr>
+            <a:lvl9pPr marL="3886200" indent="-228600" algn="l" defTabSz="914400" rtl="0" eaLnBrk="1" latinLnBrk="0" hangingPunct="1">
+              <a:spcBef>
+                <a:spcPct val="20000"/>
+              </a:spcBef>
+              <a:buFont typeface="Arial" pitchFamily="34" charset="0"/>
+              <a:buChar char="•"/>
+              <a:defRPr sz="2000" kern="1200">
+                <a:solidFill>
+                  <a:schemeClr val="tx1"/>
+                </a:solidFill>
+                <a:latin typeface="+mn-lt"/>
+                <a:ea typeface="+mn-ea"/>
+                <a:cs typeface="+mn-cs"/>
+              </a:defRPr>
+            </a:lvl9pPr>
+          </a:lstStyle>
+          <a:p>
+            <a:pPr marL="514350" indent="-514350">
+              <a:buFont typeface="+mj-lt"/>
+              <a:buAutoNum type="arabicPeriod" startAt="3"/>
+            </a:pPr>
+            <a:r>
+              <a:rPr lang="en-GB" dirty="0" smtClean="0"/>
+              <a:t>Algorithm </a:t>
+            </a:r>
+            <a:r>
+              <a:rPr lang="en-GB" dirty="0" err="1" smtClean="0"/>
+              <a:t>vectorised</a:t>
+            </a:r>
+            <a:r>
+              <a:rPr lang="en-GB" dirty="0" smtClean="0"/>
+              <a:t> to improve speed</a:t>
+            </a:r>
+            <a:endParaRPr lang="en-GB" dirty="0"/>
           </a:p>
         </p:txBody>
       </p:sp>
     </p:spTree>
     <p:extLst>
       <p:ext uri="{BB962C8B-B14F-4D97-AF65-F5344CB8AC3E}">
-        <p14:creationId xmlns:p14="http://schemas.microsoft.com/office/powerpoint/2010/main" xmlns="" val="378800283"/>
+        <p14:creationId xmlns="" xmlns:p14="http://schemas.microsoft.com/office/powerpoint/2010/main" val="3107077440"/>
       </p:ext>
     </p:extLst>
   </p:cSld>
@@ -3919,7 +4182,7 @@
             <a:spLocks noGrp="1"/>
           </p:cNvSpPr>
           <p:nvPr>
-            <p:ph type="ctrTitle"/>
+            <p:ph type="title"/>
           </p:nvPr>
         </p:nvSpPr>
         <p:spPr/>
@@ -3929,7 +4192,7 @@
           <a:p>
             <a:r>
               <a:rPr lang="en-GB" dirty="0" smtClean="0"/>
-              <a:t>Comparison</a:t>
+              <a:t>Implementation – Achievements</a:t>
             </a:r>
             <a:endParaRPr lang="en-GB" dirty="0"/>
           </a:p>
@@ -3937,12 +4200,12 @@
       </p:sp>
       <p:sp>
         <p:nvSpPr>
-          <p:cNvPr id="4" name="Subtitle 3"/>
-          <p:cNvSpPr>
-            <a:spLocks noGrp="1"/>
-          </p:cNvSpPr>
-          <p:nvPr>
-            <p:ph type="subTitle" idx="1"/>
+          <p:cNvPr id="3" name="Content Placeholder 2"/>
+          <p:cNvSpPr>
+            <a:spLocks noGrp="1"/>
+          </p:cNvSpPr>
+          <p:nvPr>
+            <p:ph idx="1"/>
           </p:nvPr>
         </p:nvSpPr>
         <p:spPr/>
@@ -3950,14 +4213,150 @@
           <a:bodyPr/>
           <a:lstStyle/>
           <a:p>
-            <a:endParaRPr lang="en-GB"/>
+            <a:pPr marL="514350" indent="-514350">
+              <a:buFont typeface="+mj-lt"/>
+              <a:buAutoNum type="arabicPeriod"/>
+            </a:pPr>
+            <a:r>
+              <a:rPr lang="en-GB" dirty="0" smtClean="0"/>
+              <a:t>Implementation with </a:t>
+            </a:r>
+            <a:r>
+              <a:rPr lang="en-GB" b="1" dirty="0" smtClean="0"/>
+              <a:t>square mask </a:t>
+            </a:r>
+            <a:r>
+              <a:rPr lang="en-GB" dirty="0" smtClean="0"/>
+              <a:t>and </a:t>
+            </a:r>
+            <a:r>
+              <a:rPr lang="en-GB" b="1" dirty="0" smtClean="0"/>
+              <a:t>simple</a:t>
+            </a:r>
+            <a:r>
+              <a:rPr lang="en-GB" dirty="0" smtClean="0"/>
+              <a:t>  </a:t>
+            </a:r>
+            <a:r>
+              <a:rPr lang="en-GB" b="1" dirty="0" smtClean="0"/>
+              <a:t>similarity equation</a:t>
+            </a:r>
+          </a:p>
+          <a:p>
+            <a:pPr marL="571500" indent="-514350">
+              <a:buFont typeface="+mj-lt"/>
+              <a:buAutoNum type="arabicPeriod"/>
+            </a:pPr>
+            <a:r>
+              <a:rPr lang="en-GB" dirty="0" smtClean="0"/>
+              <a:t> </a:t>
+            </a:r>
+            <a:r>
+              <a:rPr lang="en-GB" b="1" dirty="0" smtClean="0"/>
+              <a:t>Smoothed </a:t>
+            </a:r>
+            <a:r>
+              <a:rPr lang="en-GB" dirty="0" smtClean="0"/>
+              <a:t>similarity equation implemented</a:t>
+            </a:r>
+          </a:p>
+          <a:p>
+            <a:pPr marL="571500" indent="-514350">
+              <a:buFont typeface="+mj-lt"/>
+              <a:buAutoNum type="arabicPeriod"/>
+            </a:pPr>
+            <a:r>
+              <a:rPr lang="en-GB" dirty="0" smtClean="0"/>
+              <a:t> </a:t>
+            </a:r>
+            <a:r>
+              <a:rPr lang="en-GB" b="1" dirty="0" smtClean="0"/>
+              <a:t>Circular</a:t>
+            </a:r>
+            <a:r>
+              <a:rPr lang="en-GB" dirty="0" smtClean="0"/>
+              <a:t> mask implemented</a:t>
+            </a:r>
+          </a:p>
+          <a:p>
+            <a:pPr marL="571500" indent="-514350">
+              <a:buFont typeface="+mj-lt"/>
+              <a:buAutoNum type="arabicPeriod"/>
+            </a:pPr>
+            <a:r>
+              <a:rPr lang="en-GB" dirty="0"/>
+              <a:t>  </a:t>
+            </a:r>
+            <a:r>
+              <a:rPr lang="en-GB" b="1" dirty="0" smtClean="0"/>
+              <a:t>Inter</a:t>
+            </a:r>
+            <a:r>
+              <a:rPr lang="en-GB" dirty="0" smtClean="0"/>
+              <a:t>-Pixel </a:t>
+            </a:r>
+            <a:r>
+              <a:rPr lang="en-GB" b="1" dirty="0" smtClean="0"/>
+              <a:t>edge direction</a:t>
+            </a:r>
+            <a:r>
+              <a:rPr lang="en-GB" dirty="0" smtClean="0"/>
+              <a:t> measurement implemented</a:t>
+            </a:r>
+          </a:p>
+          <a:p>
+            <a:pPr marL="571500" indent="-514350">
+              <a:buFont typeface="+mj-lt"/>
+              <a:buAutoNum type="arabicPeriod"/>
+            </a:pPr>
+            <a:r>
+              <a:rPr lang="en-GB" dirty="0" smtClean="0"/>
+              <a:t> </a:t>
+            </a:r>
+            <a:r>
+              <a:rPr lang="en-GB" b="1" dirty="0" smtClean="0"/>
+              <a:t>Intra</a:t>
+            </a:r>
+            <a:r>
+              <a:rPr lang="en-GB" dirty="0" smtClean="0"/>
+              <a:t>-Pixel </a:t>
+            </a:r>
+            <a:r>
+              <a:rPr lang="en-GB" b="1" dirty="0" smtClean="0"/>
+              <a:t>edge direction</a:t>
+            </a:r>
+            <a:r>
+              <a:rPr lang="en-GB" dirty="0" smtClean="0"/>
+              <a:t> measurement implemented</a:t>
+            </a:r>
+          </a:p>
+          <a:p>
+            <a:pPr marL="971550" lvl="1" indent="-514350">
+              <a:buFont typeface="+mj-lt"/>
+              <a:buAutoNum type="arabicPeriod"/>
+            </a:pPr>
+            <a:endParaRPr lang="en-GB" dirty="0" smtClean="0"/>
+          </a:p>
+          <a:p>
+            <a:pPr marL="971550" lvl="1" indent="-514350">
+              <a:buFont typeface="+mj-lt"/>
+              <a:buAutoNum type="arabicPeriod"/>
+            </a:pPr>
+            <a:endParaRPr lang="en-GB" dirty="0" smtClean="0"/>
+          </a:p>
+          <a:p>
+            <a:pPr marL="971550" lvl="1" indent="-514350">
+              <a:buFont typeface="+mj-lt"/>
+              <a:buAutoNum type="arabicPeriod"/>
+            </a:pPr>
+            <a:endParaRPr lang="en-GB" dirty="0"/>
           </a:p>
         </p:txBody>
       </p:sp>
     </p:spTree>
     <p:extLst>
       <p:ext uri="{BB962C8B-B14F-4D97-AF65-F5344CB8AC3E}">
-        <p14:creationId xmlns:p14="http://schemas.microsoft.com/office/powerpoint/2010/main" xmlns="" val="2697055445"/>
+        <p14:creationId xmlns="" xmlns:p14="http://schemas.microsoft.com/office/powerpoint/2010/main" val="543308162"/>
       </p:ext>
     </p:extLst>
   </p:cSld>
@@ -3993,6 +4392,243 @@
       </p:grpSpPr>
       <p:sp>
         <p:nvSpPr>
+          <p:cNvPr id="6" name="Title 5"/>
+          <p:cNvSpPr>
+            <a:spLocks noGrp="1"/>
+          </p:cNvSpPr>
+          <p:nvPr>
+            <p:ph type="ctrTitle"/>
+          </p:nvPr>
+        </p:nvSpPr>
+        <p:spPr/>
+        <p:txBody>
+          <a:bodyPr/>
+          <a:lstStyle/>
+          <a:p>
+            <a:r>
+              <a:rPr lang="en-GB" dirty="0" smtClean="0"/>
+              <a:t>Demo</a:t>
+            </a:r>
+            <a:endParaRPr lang="en-GB" dirty="0"/>
+          </a:p>
+        </p:txBody>
+      </p:sp>
+      <p:sp>
+        <p:nvSpPr>
+          <p:cNvPr id="8" name="Subtitle 7"/>
+          <p:cNvSpPr>
+            <a:spLocks noGrp="1"/>
+          </p:cNvSpPr>
+          <p:nvPr>
+            <p:ph type="subTitle" idx="1"/>
+          </p:nvPr>
+        </p:nvSpPr>
+        <p:spPr/>
+        <p:txBody>
+          <a:bodyPr/>
+          <a:lstStyle/>
+          <a:p>
+            <a:endParaRPr lang="en-GB" dirty="0"/>
+          </a:p>
+        </p:txBody>
+      </p:sp>
+    </p:spTree>
+    <p:extLst>
+      <p:ext uri="{BB962C8B-B14F-4D97-AF65-F5344CB8AC3E}">
+        <p14:creationId xmlns="" xmlns:p14="http://schemas.microsoft.com/office/powerpoint/2010/main" val="2001286214"/>
+      </p:ext>
+    </p:extLst>
+  </p:cSld>
+  <p:clrMapOvr>
+    <a:masterClrMapping/>
+  </p:clrMapOvr>
+  <p:timing>
+    <p:tnLst>
+      <p:par>
+        <p:cTn id="1" dur="indefinite" restart="never" nodeType="tmRoot"/>
+      </p:par>
+    </p:tnLst>
+  </p:timing>
+</p:sld>
+</file>
+
+<file path=ppt/slides/slide16.xml><?xml version="1.0" encoding="utf-8"?>
+<p:sld xmlns:a="http://schemas.openxmlformats.org/drawingml/2006/main" xmlns:r="http://schemas.openxmlformats.org/officeDocument/2006/relationships" xmlns:p="http://schemas.openxmlformats.org/presentationml/2006/main">
+  <p:cSld>
+    <p:spTree>
+      <p:nvGrpSpPr>
+        <p:cNvPr id="1" name=""/>
+        <p:cNvGrpSpPr/>
+        <p:nvPr/>
+      </p:nvGrpSpPr>
+      <p:grpSpPr>
+        <a:xfrm>
+          <a:off x="0" y="0"/>
+          <a:ext cx="0" cy="0"/>
+          <a:chOff x="0" y="0"/>
+          <a:chExt cx="0" cy="0"/>
+        </a:xfrm>
+      </p:grpSpPr>
+      <p:sp>
+        <p:nvSpPr>
+          <p:cNvPr id="2" name="Title 1"/>
+          <p:cNvSpPr>
+            <a:spLocks noGrp="1"/>
+          </p:cNvSpPr>
+          <p:nvPr>
+            <p:ph type="ctrTitle"/>
+          </p:nvPr>
+        </p:nvSpPr>
+        <p:spPr/>
+        <p:txBody>
+          <a:bodyPr/>
+          <a:lstStyle/>
+          <a:p>
+            <a:r>
+              <a:rPr lang="en-GB" dirty="0" smtClean="0"/>
+              <a:t>Experimentation</a:t>
+            </a:r>
+            <a:endParaRPr lang="en-GB" dirty="0"/>
+          </a:p>
+        </p:txBody>
+      </p:sp>
+      <p:sp>
+        <p:nvSpPr>
+          <p:cNvPr id="4" name="Subtitle 3"/>
+          <p:cNvSpPr>
+            <a:spLocks noGrp="1"/>
+          </p:cNvSpPr>
+          <p:nvPr>
+            <p:ph type="subTitle" idx="1"/>
+          </p:nvPr>
+        </p:nvSpPr>
+        <p:spPr/>
+        <p:txBody>
+          <a:bodyPr/>
+          <a:lstStyle/>
+          <a:p>
+            <a:endParaRPr lang="en-GB"/>
+          </a:p>
+        </p:txBody>
+      </p:sp>
+    </p:spTree>
+    <p:extLst>
+      <p:ext uri="{BB962C8B-B14F-4D97-AF65-F5344CB8AC3E}">
+        <p14:creationId xmlns="" xmlns:p14="http://schemas.microsoft.com/office/powerpoint/2010/main" val="378800283"/>
+      </p:ext>
+    </p:extLst>
+  </p:cSld>
+  <p:clrMapOvr>
+    <a:masterClrMapping/>
+  </p:clrMapOvr>
+  <p:timing>
+    <p:tnLst>
+      <p:par>
+        <p:cTn id="1" dur="indefinite" restart="never" nodeType="tmRoot"/>
+      </p:par>
+    </p:tnLst>
+  </p:timing>
+</p:sld>
+</file>
+
+<file path=ppt/slides/slide17.xml><?xml version="1.0" encoding="utf-8"?>
+<p:sld xmlns:a="http://schemas.openxmlformats.org/drawingml/2006/main" xmlns:r="http://schemas.openxmlformats.org/officeDocument/2006/relationships" xmlns:p="http://schemas.openxmlformats.org/presentationml/2006/main">
+  <p:cSld>
+    <p:spTree>
+      <p:nvGrpSpPr>
+        <p:cNvPr id="1" name=""/>
+        <p:cNvGrpSpPr/>
+        <p:nvPr/>
+      </p:nvGrpSpPr>
+      <p:grpSpPr>
+        <a:xfrm>
+          <a:off x="0" y="0"/>
+          <a:ext cx="0" cy="0"/>
+          <a:chOff x="0" y="0"/>
+          <a:chExt cx="0" cy="0"/>
+        </a:xfrm>
+      </p:grpSpPr>
+      <p:sp>
+        <p:nvSpPr>
+          <p:cNvPr id="2" name="Title 1"/>
+          <p:cNvSpPr>
+            <a:spLocks noGrp="1"/>
+          </p:cNvSpPr>
+          <p:nvPr>
+            <p:ph type="ctrTitle"/>
+          </p:nvPr>
+        </p:nvSpPr>
+        <p:spPr/>
+        <p:txBody>
+          <a:bodyPr/>
+          <a:lstStyle/>
+          <a:p>
+            <a:r>
+              <a:rPr lang="en-GB" dirty="0" smtClean="0"/>
+              <a:t>Comparison</a:t>
+            </a:r>
+            <a:endParaRPr lang="en-GB" dirty="0"/>
+          </a:p>
+        </p:txBody>
+      </p:sp>
+      <p:sp>
+        <p:nvSpPr>
+          <p:cNvPr id="4" name="Subtitle 3"/>
+          <p:cNvSpPr>
+            <a:spLocks noGrp="1"/>
+          </p:cNvSpPr>
+          <p:nvPr>
+            <p:ph type="subTitle" idx="1"/>
+          </p:nvPr>
+        </p:nvSpPr>
+        <p:spPr/>
+        <p:txBody>
+          <a:bodyPr/>
+          <a:lstStyle/>
+          <a:p>
+            <a:endParaRPr lang="en-GB"/>
+          </a:p>
+        </p:txBody>
+      </p:sp>
+    </p:spTree>
+    <p:extLst>
+      <p:ext uri="{BB962C8B-B14F-4D97-AF65-F5344CB8AC3E}">
+        <p14:creationId xmlns="" xmlns:p14="http://schemas.microsoft.com/office/powerpoint/2010/main" val="2697055445"/>
+      </p:ext>
+    </p:extLst>
+  </p:cSld>
+  <p:clrMapOvr>
+    <a:masterClrMapping/>
+  </p:clrMapOvr>
+  <p:timing>
+    <p:tnLst>
+      <p:par>
+        <p:cTn id="1" dur="indefinite" restart="never" nodeType="tmRoot"/>
+      </p:par>
+    </p:tnLst>
+  </p:timing>
+</p:sld>
+</file>
+
+<file path=ppt/slides/slide18.xml><?xml version="1.0" encoding="utf-8"?>
+<p:sld xmlns:a="http://schemas.openxmlformats.org/drawingml/2006/main" xmlns:r="http://schemas.openxmlformats.org/officeDocument/2006/relationships" xmlns:p="http://schemas.openxmlformats.org/presentationml/2006/main">
+  <p:cSld>
+    <p:spTree>
+      <p:nvGrpSpPr>
+        <p:cNvPr id="1" name=""/>
+        <p:cNvGrpSpPr/>
+        <p:nvPr/>
+      </p:nvGrpSpPr>
+      <p:grpSpPr>
+        <a:xfrm>
+          <a:off x="0" y="0"/>
+          <a:ext cx="0" cy="0"/>
+          <a:chOff x="0" y="0"/>
+          <a:chExt cx="0" cy="0"/>
+        </a:xfrm>
+      </p:grpSpPr>
+      <p:sp>
+        <p:nvSpPr>
           <p:cNvPr id="2" name="Title 1"/>
           <p:cNvSpPr>
             <a:spLocks noGrp="1"/>
@@ -4033,13 +4669,7 @@
               <a:rPr lang="en-GB" dirty="0" smtClean="0">
                 <a:hlinkClick r:id="rId2"/>
               </a:rPr>
-              <a:t>http://users.fmrib.ox.ac.uk/~</a:t>
-            </a:r>
-            <a:r>
-              <a:rPr lang="en-GB" dirty="0" smtClean="0">
-                <a:hlinkClick r:id="rId2"/>
-              </a:rPr>
-              <a:t>steve/susan/susan/susan.html</a:t>
+              <a:t>http://users.fmrib.ox.ac.uk/~steve/susan/susan/susan.html</a:t>
             </a:r>
             <a:endParaRPr lang="en-GB" dirty="0" smtClean="0"/>
           </a:p>
@@ -4051,7 +4681,7 @@
     </p:spTree>
     <p:extLst>
       <p:ext uri="{BB962C8B-B14F-4D97-AF65-F5344CB8AC3E}">
-        <p14:creationId xmlns:p14="http://schemas.microsoft.com/office/powerpoint/2010/main" xmlns="" val="1568749011"/>
+        <p14:creationId xmlns="" xmlns:p14="http://schemas.microsoft.com/office/powerpoint/2010/main" val="1568749011"/>
       </p:ext>
     </p:extLst>
   </p:cSld>
@@ -4181,7 +4811,7 @@
     </p:spTree>
     <p:extLst>
       <p:ext uri="{BB962C8B-B14F-4D97-AF65-F5344CB8AC3E}">
-        <p14:creationId xmlns:p14="http://schemas.microsoft.com/office/powerpoint/2010/main" xmlns="" val="3044184147"/>
+        <p14:creationId xmlns="" xmlns:p14="http://schemas.microsoft.com/office/powerpoint/2010/main" val="3044184147"/>
       </p:ext>
     </p:extLst>
   </p:cSld>
@@ -4260,7 +4890,7 @@
     </p:spTree>
     <p:extLst>
       <p:ext uri="{BB962C8B-B14F-4D97-AF65-F5344CB8AC3E}">
-        <p14:creationId xmlns:p14="http://schemas.microsoft.com/office/powerpoint/2010/main" xmlns="" val="2118226303"/>
+        <p14:creationId xmlns="" xmlns:p14="http://schemas.microsoft.com/office/powerpoint/2010/main" val="2118226303"/>
       </p:ext>
     </p:extLst>
   </p:cSld>
@@ -4943,12 +5573,12 @@
       </p:sp>
       <p:sp>
         <p:nvSpPr>
-          <p:cNvPr id="3" name="Content Placeholder 2"/>
-          <p:cNvSpPr>
-            <a:spLocks noGrp="1"/>
-          </p:cNvSpPr>
-          <p:nvPr>
-            <p:ph idx="1"/>
+          <p:cNvPr id="4" name="Content Placeholder 3"/>
+          <p:cNvSpPr>
+            <a:spLocks noGrp="1"/>
+          </p:cNvSpPr>
+          <p:nvPr>
+            <p:ph sz="half" idx="1"/>
           </p:nvPr>
         </p:nvSpPr>
         <p:spPr/>
@@ -4956,7 +5586,89 @@
           <a:bodyPr/>
           <a:lstStyle/>
           <a:p>
+            <a:r>
+              <a:rPr lang="en-GB" dirty="0" smtClean="0"/>
+              <a:t>Pixel values in the USAN need comparing to the nucleus</a:t>
+            </a:r>
+          </a:p>
+          <a:p>
+            <a:r>
+              <a:rPr lang="en-GB" dirty="0" smtClean="0"/>
+              <a:t>Simplest version: rectangular window</a:t>
+            </a:r>
+          </a:p>
+          <a:p>
+            <a:r>
+              <a:rPr lang="en-GB" dirty="0" smtClean="0"/>
+              <a:t>Better version: exp(-((pixel - nucleus)/t)^6)</a:t>
+            </a:r>
+          </a:p>
+          <a:p>
             <a:endParaRPr lang="en-GB" dirty="0"/>
+          </a:p>
+        </p:txBody>
+      </p:sp>
+      <p:pic>
+        <p:nvPicPr>
+          <p:cNvPr id="1026" name="Picture 2"/>
+          <p:cNvPicPr>
+            <a:picLocks noGrp="1" noChangeAspect="1" noChangeArrowheads="1"/>
+          </p:cNvPicPr>
+          <p:nvPr>
+            <p:ph sz="half" idx="2"/>
+          </p:nvPr>
+        </p:nvPicPr>
+        <p:blipFill>
+          <a:blip r:embed="rId2" cstate="print"/>
+          <a:srcRect/>
+          <a:stretch>
+            <a:fillRect/>
+          </a:stretch>
+        </p:blipFill>
+        <p:spPr bwMode="auto">
+          <a:xfrm>
+            <a:off x="4648200" y="2799119"/>
+            <a:ext cx="4038600" cy="2128125"/>
+          </a:xfrm>
+          <a:prstGeom prst="rect">
+            <a:avLst/>
+          </a:prstGeom>
+          <a:noFill/>
+          <a:ln w="9525">
+            <a:noFill/>
+            <a:miter lim="800000"/>
+            <a:headEnd/>
+            <a:tailEnd/>
+          </a:ln>
+        </p:spPr>
+      </p:pic>
+      <p:sp>
+        <p:nvSpPr>
+          <p:cNvPr id="7" name="TextBox 6"/>
+          <p:cNvSpPr txBox="1"/>
+          <p:nvPr/>
+        </p:nvSpPr>
+        <p:spPr>
+          <a:xfrm>
+            <a:off x="4644008" y="5013176"/>
+            <a:ext cx="4032448" cy="246221"/>
+          </a:xfrm>
+          <a:prstGeom prst="rect">
+            <a:avLst/>
+          </a:prstGeom>
+          <a:noFill/>
+        </p:spPr>
+        <p:txBody>
+          <a:bodyPr wrap="square" rtlCol="0">
+            <a:spAutoFit/>
+          </a:bodyPr>
+          <a:lstStyle/>
+          <a:p>
+            <a:r>
+              <a:rPr lang="en-GB" sz="1000" dirty="0" smtClean="0"/>
+              <a:t>http://users.fmrib.ox.ac.uk/~steve/susan/susan/node6.html#c_equation</a:t>
+            </a:r>
+            <a:endParaRPr lang="en-GB" sz="1000" dirty="0"/>
           </a:p>
         </p:txBody>
       </p:sp>
@@ -4992,7 +5704,7 @@
             <a:spLocks noGrp="1"/>
           </p:cNvSpPr>
           <p:nvPr>
-            <p:ph type="ctrTitle"/>
+            <p:ph type="title"/>
           </p:nvPr>
         </p:nvSpPr>
         <p:spPr/>
@@ -5002,7 +5714,7 @@
           <a:p>
             <a:r>
               <a:rPr lang="en-GB" dirty="0" smtClean="0"/>
-              <a:t>Implementation</a:t>
+              <a:t>Theory – The Maths</a:t>
             </a:r>
             <a:endParaRPr lang="en-GB" dirty="0"/>
           </a:p>
@@ -5010,12 +5722,12 @@
       </p:sp>
       <p:sp>
         <p:nvSpPr>
-          <p:cNvPr id="4" name="Subtitle 3"/>
-          <p:cNvSpPr>
-            <a:spLocks noGrp="1"/>
-          </p:cNvSpPr>
-          <p:nvPr>
-            <p:ph type="subTitle" idx="1"/>
+          <p:cNvPr id="5" name="Content Placeholder 4"/>
+          <p:cNvSpPr>
+            <a:spLocks noGrp="1"/>
+          </p:cNvSpPr>
+          <p:nvPr>
+            <p:ph idx="1"/>
           </p:nvPr>
         </p:nvSpPr>
         <p:spPr/>
@@ -5023,27 +5735,51 @@
           <a:bodyPr/>
           <a:lstStyle/>
           <a:p>
-            <a:endParaRPr lang="en-GB"/>
+            <a:r>
+              <a:rPr lang="en-GB" dirty="0" smtClean="0"/>
+              <a:t>Once the area of the USAN is determined it is compared to a threshold (g = 3*</a:t>
+            </a:r>
+            <a:r>
+              <a:rPr lang="en-GB" dirty="0" err="1" smtClean="0"/>
+              <a:t>n</a:t>
+            </a:r>
+            <a:r>
+              <a:rPr lang="en-GB" sz="2400" dirty="0" err="1" smtClean="0"/>
+              <a:t>max</a:t>
+            </a:r>
+            <a:r>
+              <a:rPr lang="en-GB" dirty="0" smtClean="0"/>
+              <a:t>/4) and it is given a new value as:</a:t>
+            </a:r>
+          </a:p>
+          <a:p>
+            <a:pPr lvl="1"/>
+            <a:r>
+              <a:rPr lang="en-GB" dirty="0" smtClean="0"/>
+              <a:t>Area &lt; g : USAN value = g – area</a:t>
+            </a:r>
+          </a:p>
+          <a:p>
+            <a:pPr lvl="1"/>
+            <a:r>
+              <a:rPr lang="en-GB" dirty="0" smtClean="0"/>
+              <a:t>Area &gt; g : USAN value = 0</a:t>
+            </a:r>
+          </a:p>
+          <a:p>
+            <a:r>
+              <a:rPr lang="en-GB" dirty="0" smtClean="0"/>
+              <a:t>This converts minima to maxima, non-maximal suppression this sharpens the features further</a:t>
+            </a:r>
+            <a:endParaRPr lang="en-GB" dirty="0"/>
           </a:p>
         </p:txBody>
       </p:sp>
     </p:spTree>
-    <p:extLst>
-      <p:ext uri="{BB962C8B-B14F-4D97-AF65-F5344CB8AC3E}">
-        <p14:creationId xmlns:p14="http://schemas.microsoft.com/office/powerpoint/2010/main" xmlns="" val="2813178390"/>
-      </p:ext>
-    </p:extLst>
   </p:cSld>
   <p:clrMapOvr>
     <a:masterClrMapping/>
   </p:clrMapOvr>
-  <p:timing>
-    <p:tnLst>
-      <p:par>
-        <p:cTn id="1" dur="indefinite" restart="never" nodeType="tmRoot"/>
-      </p:par>
-    </p:tnLst>
-  </p:timing>
 </p:sld>
 </file>
 
@@ -5081,7 +5817,15 @@
           <a:p>
             <a:r>
               <a:rPr lang="en-GB" dirty="0" smtClean="0"/>
-              <a:t>Implementation – Overview</a:t>
+              <a:t>Theory – </a:t>
+            </a:r>
+            <a:r>
+              <a:rPr lang="en-GB" dirty="0" smtClean="0"/>
+              <a:t>E</a:t>
+            </a:r>
+            <a:r>
+              <a:rPr lang="en-GB" dirty="0" smtClean="0"/>
+              <a:t>dge Direction</a:t>
             </a:r>
             <a:endParaRPr lang="en-GB" dirty="0"/>
           </a:p>
@@ -5089,18 +5833,18 @@
       </p:sp>
       <p:sp>
         <p:nvSpPr>
-          <p:cNvPr id="3" name="Content Placeholder 2"/>
-          <p:cNvSpPr>
-            <a:spLocks noGrp="1"/>
-          </p:cNvSpPr>
-          <p:nvPr>
-            <p:ph idx="1"/>
+          <p:cNvPr id="4" name="Content Placeholder 3"/>
+          <p:cNvSpPr>
+            <a:spLocks noGrp="1"/>
+          </p:cNvSpPr>
+          <p:nvPr>
+            <p:ph sz="half" idx="1"/>
           </p:nvPr>
         </p:nvSpPr>
         <p:spPr>
           <a:xfrm>
-            <a:off x="457200" y="1600201"/>
-            <a:ext cx="8229600" cy="676672"/>
+            <a:off x="457200" y="1600200"/>
+            <a:ext cx="4690864" cy="4525963"/>
           </a:xfrm>
         </p:spPr>
         <p:txBody>
@@ -5108,324 +5852,1059 @@
           <a:lstStyle/>
           <a:p>
             <a:r>
-              <a:rPr lang="en-GB" b="1" dirty="0" smtClean="0"/>
-              <a:t>Python</a:t>
-            </a:r>
-            <a:r>
               <a:rPr lang="en-GB" dirty="0" smtClean="0"/>
-              <a:t> with </a:t>
-            </a:r>
-            <a:r>
-              <a:rPr lang="en-GB" dirty="0" err="1" smtClean="0"/>
-              <a:t>Numpy</a:t>
-            </a:r>
+              <a:t>Simple case: “Inter-pixel” edge</a:t>
+            </a:r>
+          </a:p>
+          <a:p>
             <a:r>
               <a:rPr lang="en-GB" dirty="0" smtClean="0"/>
-              <a:t> and </a:t>
-            </a:r>
-            <a:r>
-              <a:rPr lang="en-GB" dirty="0" err="1" smtClean="0"/>
-              <a:t>Matplotlib</a:t>
-            </a:r>
+              <a:t>The direction of an edge can be calculated using SUSAN</a:t>
+            </a:r>
+          </a:p>
+          <a:p>
+            <a:r>
+              <a:rPr lang="en-GB" dirty="0" smtClean="0"/>
+              <a:t>The difference between the “centre of gravity” and the nucleus can be used</a:t>
+            </a:r>
+          </a:p>
+          <a:p>
             <a:endParaRPr lang="en-GB" dirty="0"/>
           </a:p>
         </p:txBody>
       </p:sp>
-      <p:sp>
-        <p:nvSpPr>
-          <p:cNvPr id="4" name="Rectangle 3"/>
+      <p:grpSp>
+        <p:nvGrpSpPr>
+          <p:cNvPr id="6" name="Group 5"/>
+          <p:cNvGrpSpPr/>
+          <p:nvPr/>
+        </p:nvGrpSpPr>
+        <p:grpSpPr>
+          <a:xfrm>
+            <a:off x="5580112" y="1700808"/>
+            <a:ext cx="2952328" cy="3744416"/>
+            <a:chOff x="5580112" y="1916832"/>
+            <a:chExt cx="2952328" cy="3744416"/>
+          </a:xfrm>
+        </p:grpSpPr>
+        <p:sp>
+          <p:nvSpPr>
+            <p:cNvPr id="7" name="Rectangle 6"/>
+            <p:cNvSpPr/>
+            <p:nvPr/>
+          </p:nvSpPr>
+          <p:spPr>
+            <a:xfrm>
+              <a:off x="5580112" y="1916832"/>
+              <a:ext cx="2952328" cy="3744416"/>
+            </a:xfrm>
+            <a:prstGeom prst="rect">
+              <a:avLst/>
+            </a:prstGeom>
+            <a:solidFill>
+              <a:schemeClr val="bg1"/>
+            </a:solidFill>
+          </p:spPr>
+          <p:style>
+            <a:lnRef idx="2">
+              <a:schemeClr val="accent1">
+                <a:shade val="50000"/>
+              </a:schemeClr>
+            </a:lnRef>
+            <a:fillRef idx="1">
+              <a:schemeClr val="accent1"/>
+            </a:fillRef>
+            <a:effectRef idx="0">
+              <a:schemeClr val="accent1"/>
+            </a:effectRef>
+            <a:fontRef idx="minor">
+              <a:schemeClr val="lt1"/>
+            </a:fontRef>
+          </p:style>
+          <p:txBody>
+            <a:bodyPr rtlCol="0" anchor="ctr"/>
+            <a:lstStyle/>
+            <a:p>
+              <a:pPr algn="ctr"/>
+              <a:endParaRPr lang="en-GB"/>
+            </a:p>
+          </p:txBody>
+        </p:sp>
+        <p:sp>
+          <p:nvSpPr>
+            <p:cNvPr id="8" name="Rectangle 7"/>
+            <p:cNvSpPr/>
+            <p:nvPr/>
+          </p:nvSpPr>
+          <p:spPr>
+            <a:xfrm>
+              <a:off x="6732240" y="3789040"/>
+              <a:ext cx="1800200" cy="1872208"/>
+            </a:xfrm>
+            <a:prstGeom prst="rect">
+              <a:avLst/>
+            </a:prstGeom>
+          </p:spPr>
+          <p:style>
+            <a:lnRef idx="2">
+              <a:schemeClr val="accent1">
+                <a:shade val="50000"/>
+              </a:schemeClr>
+            </a:lnRef>
+            <a:fillRef idx="1">
+              <a:schemeClr val="accent1"/>
+            </a:fillRef>
+            <a:effectRef idx="0">
+              <a:schemeClr val="accent1"/>
+            </a:effectRef>
+            <a:fontRef idx="minor">
+              <a:schemeClr val="lt1"/>
+            </a:fontRef>
+          </p:style>
+          <p:txBody>
+            <a:bodyPr rtlCol="0" anchor="ctr"/>
+            <a:lstStyle/>
+            <a:p>
+              <a:pPr algn="ctr"/>
+              <a:endParaRPr lang="en-GB"/>
+            </a:p>
+          </p:txBody>
+        </p:sp>
+      </p:grpSp>
+      <p:grpSp>
+        <p:nvGrpSpPr>
+          <p:cNvPr id="9" name="Group 8"/>
+          <p:cNvGrpSpPr/>
+          <p:nvPr/>
+        </p:nvGrpSpPr>
+        <p:grpSpPr>
+          <a:xfrm>
+            <a:off x="5940152" y="2204864"/>
+            <a:ext cx="648072" cy="648072"/>
+            <a:chOff x="5940152" y="2204864"/>
+            <a:chExt cx="648072" cy="648072"/>
+          </a:xfrm>
+        </p:grpSpPr>
+        <p:sp>
+          <p:nvSpPr>
+            <p:cNvPr id="10" name="Oval 9"/>
+            <p:cNvSpPr/>
+            <p:nvPr/>
+          </p:nvSpPr>
+          <p:spPr>
+            <a:xfrm>
+              <a:off x="5940152" y="2204864"/>
+              <a:ext cx="648072" cy="648072"/>
+            </a:xfrm>
+            <a:prstGeom prst="ellipse">
+              <a:avLst/>
+            </a:prstGeom>
+            <a:noFill/>
+            <a:ln>
+              <a:solidFill>
+                <a:schemeClr val="accent2"/>
+              </a:solidFill>
+            </a:ln>
+          </p:spPr>
+          <p:style>
+            <a:lnRef idx="2">
+              <a:schemeClr val="accent1">
+                <a:shade val="50000"/>
+              </a:schemeClr>
+            </a:lnRef>
+            <a:fillRef idx="1">
+              <a:schemeClr val="accent1"/>
+            </a:fillRef>
+            <a:effectRef idx="0">
+              <a:schemeClr val="accent1"/>
+            </a:effectRef>
+            <a:fontRef idx="minor">
+              <a:schemeClr val="lt1"/>
+            </a:fontRef>
+          </p:style>
+          <p:txBody>
+            <a:bodyPr rtlCol="0" anchor="ctr"/>
+            <a:lstStyle/>
+            <a:p>
+              <a:pPr algn="ctr"/>
+              <a:endParaRPr lang="en-GB"/>
+            </a:p>
+          </p:txBody>
+        </p:sp>
+        <p:sp>
+          <p:nvSpPr>
+            <p:cNvPr id="11" name="Multiply 10"/>
+            <p:cNvSpPr/>
+            <p:nvPr/>
+          </p:nvSpPr>
+          <p:spPr>
+            <a:xfrm>
+              <a:off x="6156176" y="2420888"/>
+              <a:ext cx="216024" cy="216024"/>
+            </a:xfrm>
+            <a:prstGeom prst="mathMultiply">
+              <a:avLst/>
+            </a:prstGeom>
+            <a:solidFill>
+              <a:schemeClr val="accent2"/>
+            </a:solidFill>
+            <a:ln>
+              <a:solidFill>
+                <a:schemeClr val="accent2"/>
+              </a:solidFill>
+            </a:ln>
+          </p:spPr>
+          <p:style>
+            <a:lnRef idx="2">
+              <a:schemeClr val="accent1">
+                <a:shade val="50000"/>
+              </a:schemeClr>
+            </a:lnRef>
+            <a:fillRef idx="1">
+              <a:schemeClr val="accent1"/>
+            </a:fillRef>
+            <a:effectRef idx="0">
+              <a:schemeClr val="accent1"/>
+            </a:effectRef>
+            <a:fontRef idx="minor">
+              <a:schemeClr val="lt1"/>
+            </a:fontRef>
+          </p:style>
+          <p:txBody>
+            <a:bodyPr rtlCol="0" anchor="ctr"/>
+            <a:lstStyle/>
+            <a:p>
+              <a:pPr algn="ctr"/>
+              <a:endParaRPr lang="en-GB"/>
+            </a:p>
+          </p:txBody>
+        </p:sp>
+      </p:grpSp>
+      <p:grpSp>
+        <p:nvGrpSpPr>
+          <p:cNvPr id="12" name="Group 11"/>
+          <p:cNvGrpSpPr/>
+          <p:nvPr/>
+        </p:nvGrpSpPr>
+        <p:grpSpPr>
+          <a:xfrm>
+            <a:off x="6516216" y="3356992"/>
+            <a:ext cx="648072" cy="648072"/>
+            <a:chOff x="5940152" y="2204864"/>
+            <a:chExt cx="648072" cy="648072"/>
+          </a:xfrm>
+        </p:grpSpPr>
+        <p:sp>
+          <p:nvSpPr>
+            <p:cNvPr id="13" name="Oval 12"/>
+            <p:cNvSpPr/>
+            <p:nvPr/>
+          </p:nvSpPr>
+          <p:spPr>
+            <a:xfrm>
+              <a:off x="5940152" y="2204864"/>
+              <a:ext cx="648072" cy="648072"/>
+            </a:xfrm>
+            <a:prstGeom prst="ellipse">
+              <a:avLst/>
+            </a:prstGeom>
+            <a:noFill/>
+            <a:ln>
+              <a:solidFill>
+                <a:schemeClr val="accent2"/>
+              </a:solidFill>
+            </a:ln>
+          </p:spPr>
+          <p:style>
+            <a:lnRef idx="2">
+              <a:schemeClr val="accent1">
+                <a:shade val="50000"/>
+              </a:schemeClr>
+            </a:lnRef>
+            <a:fillRef idx="1">
+              <a:schemeClr val="accent1"/>
+            </a:fillRef>
+            <a:effectRef idx="0">
+              <a:schemeClr val="accent1"/>
+            </a:effectRef>
+            <a:fontRef idx="minor">
+              <a:schemeClr val="lt1"/>
+            </a:fontRef>
+          </p:style>
+          <p:txBody>
+            <a:bodyPr rtlCol="0" anchor="ctr"/>
+            <a:lstStyle/>
+            <a:p>
+              <a:pPr algn="ctr"/>
+              <a:endParaRPr lang="en-GB"/>
+            </a:p>
+          </p:txBody>
+        </p:sp>
+        <p:sp>
+          <p:nvSpPr>
+            <p:cNvPr id="14" name="Multiply 13"/>
+            <p:cNvSpPr/>
+            <p:nvPr/>
+          </p:nvSpPr>
+          <p:spPr>
+            <a:xfrm>
+              <a:off x="6156176" y="2420888"/>
+              <a:ext cx="216024" cy="216024"/>
+            </a:xfrm>
+            <a:prstGeom prst="mathMultiply">
+              <a:avLst/>
+            </a:prstGeom>
+            <a:solidFill>
+              <a:schemeClr val="accent2"/>
+            </a:solidFill>
+            <a:ln>
+              <a:solidFill>
+                <a:schemeClr val="accent2"/>
+              </a:solidFill>
+            </a:ln>
+          </p:spPr>
+          <p:style>
+            <a:lnRef idx="2">
+              <a:schemeClr val="accent1">
+                <a:shade val="50000"/>
+              </a:schemeClr>
+            </a:lnRef>
+            <a:fillRef idx="1">
+              <a:schemeClr val="accent1"/>
+            </a:fillRef>
+            <a:effectRef idx="0">
+              <a:schemeClr val="accent1"/>
+            </a:effectRef>
+            <a:fontRef idx="minor">
+              <a:schemeClr val="lt1"/>
+            </a:fontRef>
+          </p:style>
+          <p:txBody>
+            <a:bodyPr rtlCol="0" anchor="ctr"/>
+            <a:lstStyle/>
+            <a:p>
+              <a:pPr algn="ctr"/>
+              <a:endParaRPr lang="en-GB"/>
+            </a:p>
+          </p:txBody>
+        </p:sp>
+      </p:grpSp>
+      <p:grpSp>
+        <p:nvGrpSpPr>
+          <p:cNvPr id="15" name="Group 14"/>
+          <p:cNvGrpSpPr/>
+          <p:nvPr/>
+        </p:nvGrpSpPr>
+        <p:grpSpPr>
+          <a:xfrm>
+            <a:off x="7668344" y="3356992"/>
+            <a:ext cx="648072" cy="648072"/>
+            <a:chOff x="5940152" y="2204864"/>
+            <a:chExt cx="648072" cy="648072"/>
+          </a:xfrm>
+        </p:grpSpPr>
+        <p:sp>
+          <p:nvSpPr>
+            <p:cNvPr id="16" name="Oval 15"/>
+            <p:cNvSpPr/>
+            <p:nvPr/>
+          </p:nvSpPr>
+          <p:spPr>
+            <a:xfrm>
+              <a:off x="5940152" y="2204864"/>
+              <a:ext cx="648072" cy="648072"/>
+            </a:xfrm>
+            <a:prstGeom prst="ellipse">
+              <a:avLst/>
+            </a:prstGeom>
+            <a:noFill/>
+            <a:ln>
+              <a:solidFill>
+                <a:schemeClr val="accent2"/>
+              </a:solidFill>
+            </a:ln>
+          </p:spPr>
+          <p:style>
+            <a:lnRef idx="2">
+              <a:schemeClr val="accent1">
+                <a:shade val="50000"/>
+              </a:schemeClr>
+            </a:lnRef>
+            <a:fillRef idx="1">
+              <a:schemeClr val="accent1"/>
+            </a:fillRef>
+            <a:effectRef idx="0">
+              <a:schemeClr val="accent1"/>
+            </a:effectRef>
+            <a:fontRef idx="minor">
+              <a:schemeClr val="lt1"/>
+            </a:fontRef>
+          </p:style>
+          <p:txBody>
+            <a:bodyPr rtlCol="0" anchor="ctr"/>
+            <a:lstStyle/>
+            <a:p>
+              <a:pPr algn="ctr"/>
+              <a:endParaRPr lang="en-GB"/>
+            </a:p>
+          </p:txBody>
+        </p:sp>
+        <p:sp>
+          <p:nvSpPr>
+            <p:cNvPr id="17" name="Multiply 16"/>
+            <p:cNvSpPr/>
+            <p:nvPr/>
+          </p:nvSpPr>
+          <p:spPr>
+            <a:xfrm>
+              <a:off x="6156176" y="2420888"/>
+              <a:ext cx="216024" cy="216024"/>
+            </a:xfrm>
+            <a:prstGeom prst="mathMultiply">
+              <a:avLst/>
+            </a:prstGeom>
+            <a:solidFill>
+              <a:schemeClr val="accent2"/>
+            </a:solidFill>
+            <a:ln>
+              <a:solidFill>
+                <a:schemeClr val="accent2"/>
+              </a:solidFill>
+            </a:ln>
+          </p:spPr>
+          <p:style>
+            <a:lnRef idx="2">
+              <a:schemeClr val="accent1">
+                <a:shade val="50000"/>
+              </a:schemeClr>
+            </a:lnRef>
+            <a:fillRef idx="1">
+              <a:schemeClr val="accent1"/>
+            </a:fillRef>
+            <a:effectRef idx="0">
+              <a:schemeClr val="accent1"/>
+            </a:effectRef>
+            <a:fontRef idx="minor">
+              <a:schemeClr val="lt1"/>
+            </a:fontRef>
+          </p:style>
+          <p:txBody>
+            <a:bodyPr rtlCol="0" anchor="ctr"/>
+            <a:lstStyle/>
+            <a:p>
+              <a:pPr algn="ctr"/>
+              <a:endParaRPr lang="en-GB"/>
+            </a:p>
+          </p:txBody>
+        </p:sp>
+      </p:grpSp>
+      <p:grpSp>
+        <p:nvGrpSpPr>
+          <p:cNvPr id="18" name="Group 17"/>
+          <p:cNvGrpSpPr/>
+          <p:nvPr/>
+        </p:nvGrpSpPr>
+        <p:grpSpPr>
+          <a:xfrm>
+            <a:off x="7380312" y="4581128"/>
+            <a:ext cx="648072" cy="648072"/>
+            <a:chOff x="5940152" y="2204864"/>
+            <a:chExt cx="648072" cy="648072"/>
+          </a:xfrm>
+        </p:grpSpPr>
+        <p:sp>
+          <p:nvSpPr>
+            <p:cNvPr id="19" name="Oval 18"/>
+            <p:cNvSpPr/>
+            <p:nvPr/>
+          </p:nvSpPr>
+          <p:spPr>
+            <a:xfrm>
+              <a:off x="5940152" y="2204864"/>
+              <a:ext cx="648072" cy="648072"/>
+            </a:xfrm>
+            <a:prstGeom prst="ellipse">
+              <a:avLst/>
+            </a:prstGeom>
+            <a:noFill/>
+            <a:ln>
+              <a:solidFill>
+                <a:schemeClr val="accent2"/>
+              </a:solidFill>
+            </a:ln>
+          </p:spPr>
+          <p:style>
+            <a:lnRef idx="2">
+              <a:schemeClr val="accent1">
+                <a:shade val="50000"/>
+              </a:schemeClr>
+            </a:lnRef>
+            <a:fillRef idx="1">
+              <a:schemeClr val="accent1"/>
+            </a:fillRef>
+            <a:effectRef idx="0">
+              <a:schemeClr val="accent1"/>
+            </a:effectRef>
+            <a:fontRef idx="minor">
+              <a:schemeClr val="lt1"/>
+            </a:fontRef>
+          </p:style>
+          <p:txBody>
+            <a:bodyPr rtlCol="0" anchor="ctr"/>
+            <a:lstStyle/>
+            <a:p>
+              <a:pPr algn="ctr"/>
+              <a:endParaRPr lang="en-GB"/>
+            </a:p>
+          </p:txBody>
+        </p:sp>
+        <p:sp>
+          <p:nvSpPr>
+            <p:cNvPr id="20" name="Multiply 19"/>
+            <p:cNvSpPr/>
+            <p:nvPr/>
+          </p:nvSpPr>
+          <p:spPr>
+            <a:xfrm>
+              <a:off x="6156176" y="2420888"/>
+              <a:ext cx="216024" cy="216024"/>
+            </a:xfrm>
+            <a:prstGeom prst="mathMultiply">
+              <a:avLst/>
+            </a:prstGeom>
+            <a:solidFill>
+              <a:schemeClr val="accent2"/>
+            </a:solidFill>
+            <a:ln>
+              <a:solidFill>
+                <a:schemeClr val="accent2"/>
+              </a:solidFill>
+            </a:ln>
+          </p:spPr>
+          <p:style>
+            <a:lnRef idx="2">
+              <a:schemeClr val="accent1">
+                <a:shade val="50000"/>
+              </a:schemeClr>
+            </a:lnRef>
+            <a:fillRef idx="1">
+              <a:schemeClr val="accent1"/>
+            </a:fillRef>
+            <a:effectRef idx="0">
+              <a:schemeClr val="accent1"/>
+            </a:effectRef>
+            <a:fontRef idx="minor">
+              <a:schemeClr val="lt1"/>
+            </a:fontRef>
+          </p:style>
+          <p:txBody>
+            <a:bodyPr rtlCol="0" anchor="ctr"/>
+            <a:lstStyle/>
+            <a:p>
+              <a:pPr algn="ctr"/>
+              <a:endParaRPr lang="en-GB"/>
+            </a:p>
+          </p:txBody>
+        </p:sp>
+      </p:grpSp>
+      <p:sp>
+        <p:nvSpPr>
+          <p:cNvPr id="21" name="Oval 20"/>
           <p:cNvSpPr/>
           <p:nvPr/>
         </p:nvSpPr>
         <p:spPr>
           <a:xfrm>
-            <a:off x="65076" y="6304002"/>
-            <a:ext cx="8928992" cy="553998"/>
+            <a:off x="6156176" y="2420888"/>
+            <a:ext cx="216024" cy="216024"/>
           </a:xfrm>
-          <a:prstGeom prst="rect">
+          <a:prstGeom prst="ellipse">
             <a:avLst/>
           </a:prstGeom>
+          <a:noFill/>
+          <a:ln>
+            <a:solidFill>
+              <a:schemeClr val="accent3"/>
+            </a:solidFill>
+          </a:ln>
         </p:spPr>
-        <p:txBody>
-          <a:bodyPr wrap="square">
-            <a:spAutoFit/>
-          </a:bodyPr>
-          <a:lstStyle/>
-          <a:p>
-            <a:r>
-              <a:rPr lang="en-GB" sz="1000" dirty="0" smtClean="0"/>
-              <a:t>Images:</a:t>
-            </a:r>
-          </a:p>
-          <a:p>
-            <a:pPr marL="171450" indent="-171450">
-              <a:buFont typeface="Arial" pitchFamily="34" charset="0"/>
-              <a:buChar char="•"/>
-            </a:pPr>
-            <a:r>
-              <a:rPr lang="en-GB" sz="1000" dirty="0" smtClean="0"/>
-              <a:t>http://urania.udea.edu.co/sites/astronomia-2.0/pages/descargas.rs/files/descargasdt5vi/Cursos/CursosElectivos/FisicaAstrofisicaComputacional/2009-2/Documentacion/matplotlib/examples/pylab_examples/quiver_demo.html </a:t>
-            </a:r>
-            <a:endParaRPr lang="en-GB" sz="1000" dirty="0"/>
-          </a:p>
-        </p:txBody>
-      </p:sp>
-      <p:pic>
-        <p:nvPicPr>
-          <p:cNvPr id="1027" name="Picture 3"/>
-          <p:cNvPicPr>
-            <a:picLocks noChangeAspect="1" noChangeArrowheads="1"/>
-          </p:cNvPicPr>
+        <p:style>
+          <a:lnRef idx="2">
+            <a:schemeClr val="accent1">
+              <a:shade val="50000"/>
+            </a:schemeClr>
+          </a:lnRef>
+          <a:fillRef idx="1">
+            <a:schemeClr val="accent1"/>
+          </a:fillRef>
+          <a:effectRef idx="0">
+            <a:schemeClr val="accent1"/>
+          </a:effectRef>
+          <a:fontRef idx="minor">
+            <a:schemeClr val="lt1"/>
+          </a:fontRef>
+        </p:style>
+        <p:txBody>
+          <a:bodyPr rtlCol="0" anchor="ctr"/>
+          <a:lstStyle/>
+          <a:p>
+            <a:pPr algn="ctr"/>
+            <a:endParaRPr lang="en-GB"/>
+          </a:p>
+        </p:txBody>
+      </p:sp>
+      <p:sp>
+        <p:nvSpPr>
+          <p:cNvPr id="22" name="Oval 21"/>
+          <p:cNvSpPr/>
           <p:nvPr/>
-        </p:nvPicPr>
-        <p:blipFill>
-          <a:blip r:embed="rId2" cstate="print">
-            <a:extLst>
-              <a:ext uri="{28A0092B-C50C-407E-A947-70E740481C1C}">
-                <a14:useLocalDpi xmlns:a14="http://schemas.microsoft.com/office/drawing/2010/main" xmlns="" val="0"/>
-              </a:ext>
-            </a:extLst>
-          </a:blip>
-          <a:srcRect/>
-          <a:stretch>
-            <a:fillRect/>
-          </a:stretch>
-        </p:blipFill>
-        <p:spPr bwMode="auto">
+        </p:nvSpPr>
+        <p:spPr>
           <a:xfrm>
-            <a:off x="3419872" y="2200425"/>
-            <a:ext cx="2448272" cy="2003132"/>
+            <a:off x="6804248" y="3645024"/>
+            <a:ext cx="216024" cy="216024"/>
+          </a:xfrm>
+          <a:prstGeom prst="ellipse">
+            <a:avLst/>
+          </a:prstGeom>
+          <a:noFill/>
+          <a:ln>
+            <a:solidFill>
+              <a:schemeClr val="accent3"/>
+            </a:solidFill>
+          </a:ln>
+        </p:spPr>
+        <p:style>
+          <a:lnRef idx="2">
+            <a:schemeClr val="accent1">
+              <a:shade val="50000"/>
+            </a:schemeClr>
+          </a:lnRef>
+          <a:fillRef idx="1">
+            <a:schemeClr val="accent1"/>
+          </a:fillRef>
+          <a:effectRef idx="0">
+            <a:schemeClr val="accent1"/>
+          </a:effectRef>
+          <a:fontRef idx="minor">
+            <a:schemeClr val="lt1"/>
+          </a:fontRef>
+        </p:style>
+        <p:txBody>
+          <a:bodyPr rtlCol="0" anchor="ctr"/>
+          <a:lstStyle/>
+          <a:p>
+            <a:pPr algn="ctr"/>
+            <a:endParaRPr lang="en-GB"/>
+          </a:p>
+        </p:txBody>
+      </p:sp>
+      <p:sp>
+        <p:nvSpPr>
+          <p:cNvPr id="23" name="Oval 22"/>
+          <p:cNvSpPr/>
+          <p:nvPr/>
+        </p:nvSpPr>
+        <p:spPr>
+          <a:xfrm>
+            <a:off x="7884368" y="3717032"/>
+            <a:ext cx="216024" cy="216024"/>
+          </a:xfrm>
+          <a:prstGeom prst="ellipse">
+            <a:avLst/>
+          </a:prstGeom>
+          <a:noFill/>
+          <a:ln>
+            <a:solidFill>
+              <a:schemeClr val="accent3"/>
+            </a:solidFill>
+          </a:ln>
+        </p:spPr>
+        <p:style>
+          <a:lnRef idx="2">
+            <a:schemeClr val="accent1">
+              <a:shade val="50000"/>
+            </a:schemeClr>
+          </a:lnRef>
+          <a:fillRef idx="1">
+            <a:schemeClr val="accent1"/>
+          </a:fillRef>
+          <a:effectRef idx="0">
+            <a:schemeClr val="accent1"/>
+          </a:effectRef>
+          <a:fontRef idx="minor">
+            <a:schemeClr val="lt1"/>
+          </a:fontRef>
+        </p:style>
+        <p:txBody>
+          <a:bodyPr rtlCol="0" anchor="ctr"/>
+          <a:lstStyle/>
+          <a:p>
+            <a:pPr algn="ctr"/>
+            <a:endParaRPr lang="en-GB"/>
+          </a:p>
+        </p:txBody>
+      </p:sp>
+      <p:sp>
+        <p:nvSpPr>
+          <p:cNvPr id="24" name="Oval 23"/>
+          <p:cNvSpPr/>
+          <p:nvPr/>
+        </p:nvSpPr>
+        <p:spPr>
+          <a:xfrm>
+            <a:off x="7596336" y="4797152"/>
+            <a:ext cx="216024" cy="216024"/>
+          </a:xfrm>
+          <a:prstGeom prst="ellipse">
+            <a:avLst/>
+          </a:prstGeom>
+          <a:noFill/>
+          <a:ln>
+            <a:solidFill>
+              <a:schemeClr val="accent3"/>
+            </a:solidFill>
+          </a:ln>
+        </p:spPr>
+        <p:style>
+          <a:lnRef idx="2">
+            <a:schemeClr val="accent1">
+              <a:shade val="50000"/>
+            </a:schemeClr>
+          </a:lnRef>
+          <a:fillRef idx="1">
+            <a:schemeClr val="accent1"/>
+          </a:fillRef>
+          <a:effectRef idx="0">
+            <a:schemeClr val="accent1"/>
+          </a:effectRef>
+          <a:fontRef idx="minor">
+            <a:schemeClr val="lt1"/>
+          </a:fontRef>
+        </p:style>
+        <p:txBody>
+          <a:bodyPr rtlCol="0" anchor="ctr"/>
+          <a:lstStyle/>
+          <a:p>
+            <a:pPr algn="ctr"/>
+            <a:endParaRPr lang="en-GB"/>
+          </a:p>
+        </p:txBody>
+      </p:sp>
+      <p:sp>
+        <p:nvSpPr>
+          <p:cNvPr id="25" name="Oval 24"/>
+          <p:cNvSpPr/>
+          <p:nvPr/>
+        </p:nvSpPr>
+        <p:spPr>
+          <a:xfrm>
+            <a:off x="5652120" y="5589240"/>
+            <a:ext cx="216024" cy="216024"/>
+          </a:xfrm>
+          <a:prstGeom prst="ellipse">
+            <a:avLst/>
+          </a:prstGeom>
+          <a:noFill/>
+          <a:ln>
+            <a:solidFill>
+              <a:schemeClr val="accent3"/>
+            </a:solidFill>
+          </a:ln>
+        </p:spPr>
+        <p:style>
+          <a:lnRef idx="2">
+            <a:schemeClr val="accent1">
+              <a:shade val="50000"/>
+            </a:schemeClr>
+          </a:lnRef>
+          <a:fillRef idx="1">
+            <a:schemeClr val="accent1"/>
+          </a:fillRef>
+          <a:effectRef idx="0">
+            <a:schemeClr val="accent1"/>
+          </a:effectRef>
+          <a:fontRef idx="minor">
+            <a:schemeClr val="lt1"/>
+          </a:fontRef>
+        </p:style>
+        <p:txBody>
+          <a:bodyPr rtlCol="0" anchor="ctr"/>
+          <a:lstStyle/>
+          <a:p>
+            <a:pPr algn="ctr"/>
+            <a:endParaRPr lang="en-GB"/>
+          </a:p>
+        </p:txBody>
+      </p:sp>
+      <p:sp>
+        <p:nvSpPr>
+          <p:cNvPr id="28" name="Multiply 27"/>
+          <p:cNvSpPr/>
+          <p:nvPr/>
+        </p:nvSpPr>
+        <p:spPr>
+          <a:xfrm>
+            <a:off x="5652120" y="5877272"/>
+            <a:ext cx="216024" cy="216024"/>
+          </a:xfrm>
+          <a:prstGeom prst="mathMultiply">
+            <a:avLst/>
+          </a:prstGeom>
+          <a:solidFill>
+            <a:schemeClr val="accent2"/>
+          </a:solidFill>
+          <a:ln>
+            <a:solidFill>
+              <a:schemeClr val="accent2"/>
+            </a:solidFill>
+          </a:ln>
+        </p:spPr>
+        <p:style>
+          <a:lnRef idx="2">
+            <a:schemeClr val="accent1">
+              <a:shade val="50000"/>
+            </a:schemeClr>
+          </a:lnRef>
+          <a:fillRef idx="1">
+            <a:schemeClr val="accent1"/>
+          </a:fillRef>
+          <a:effectRef idx="0">
+            <a:schemeClr val="accent1"/>
+          </a:effectRef>
+          <a:fontRef idx="minor">
+            <a:schemeClr val="lt1"/>
+          </a:fontRef>
+        </p:style>
+        <p:txBody>
+          <a:bodyPr rtlCol="0" anchor="ctr"/>
+          <a:lstStyle/>
+          <a:p>
+            <a:pPr algn="ctr"/>
+            <a:endParaRPr lang="en-GB"/>
+          </a:p>
+        </p:txBody>
+      </p:sp>
+      <p:sp>
+        <p:nvSpPr>
+          <p:cNvPr id="29" name="TextBox 28"/>
+          <p:cNvSpPr txBox="1"/>
+          <p:nvPr/>
+        </p:nvSpPr>
+        <p:spPr>
+          <a:xfrm>
+            <a:off x="6012160" y="5589240"/>
+            <a:ext cx="2520280" cy="276999"/>
           </a:xfrm>
           <a:prstGeom prst="rect">
             <a:avLst/>
           </a:prstGeom>
           <a:noFill/>
-          <a:ln>
-            <a:noFill/>
-          </a:ln>
-          <a:effectLst/>
-          <a:extLst>
-            <a:ext uri="{909E8E84-426E-40DD-AFC4-6F175D3DCCD1}">
-              <a14:hiddenFill xmlns:a14="http://schemas.microsoft.com/office/drawing/2010/main" xmlns="">
-                <a:solidFill>
-                  <a:schemeClr val="accent1"/>
-                </a:solidFill>
-              </a14:hiddenFill>
-            </a:ext>
-            <a:ext uri="{91240B29-F687-4F45-9708-019B960494DF}">
-              <a14:hiddenLine xmlns:a14="http://schemas.microsoft.com/office/drawing/2010/main" xmlns="" w="9525">
-                <a:solidFill>
-                  <a:schemeClr val="tx1"/>
-                </a:solidFill>
-                <a:miter lim="800000"/>
-                <a:headEnd/>
-                <a:tailEnd/>
-              </a14:hiddenLine>
-            </a:ext>
-            <a:ext uri="{AF507438-7753-43E0-B8FC-AC1667EBCBE1}">
-              <a14:hiddenEffects xmlns:a14="http://schemas.microsoft.com/office/drawing/2010/main" xmlns="">
-                <a:effectLst>
-                  <a:outerShdw dist="35921" dir="2700000" algn="ctr" rotWithShape="0">
-                    <a:schemeClr val="bg2"/>
-                  </a:outerShdw>
-                </a:effectLst>
-              </a14:hiddenEffects>
-            </a:ext>
-          </a:extLst>
         </p:spPr>
-      </p:pic>
-      <p:sp>
-        <p:nvSpPr>
-          <p:cNvPr id="7" name="Content Placeholder 2"/>
-          <p:cNvSpPr txBox="1">
-            <a:spLocks/>
-          </p:cNvSpPr>
+        <p:txBody>
+          <a:bodyPr wrap="square" rtlCol="0">
+            <a:spAutoFit/>
+          </a:bodyPr>
+          <a:lstStyle/>
+          <a:p>
+            <a:r>
+              <a:rPr lang="en-GB" sz="1200" dirty="0" smtClean="0"/>
+              <a:t>Centre of gravity</a:t>
+            </a:r>
+            <a:endParaRPr lang="en-GB" sz="1200" dirty="0"/>
+          </a:p>
+        </p:txBody>
+      </p:sp>
+      <p:sp>
+        <p:nvSpPr>
+          <p:cNvPr id="30" name="TextBox 29"/>
+          <p:cNvSpPr txBox="1"/>
           <p:nvPr/>
         </p:nvSpPr>
         <p:spPr>
           <a:xfrm>
-            <a:off x="446856" y="4264496"/>
-            <a:ext cx="8229600" cy="676672"/>
+            <a:off x="6084168" y="5877272"/>
+            <a:ext cx="2520280" cy="276999"/>
           </a:xfrm>
           <a:prstGeom prst="rect">
             <a:avLst/>
           </a:prstGeom>
+          <a:noFill/>
         </p:spPr>
         <p:txBody>
-          <a:bodyPr vert="horz" lIns="91440" tIns="45720" rIns="91440" bIns="45720" rtlCol="0">
-            <a:normAutofit/>
+          <a:bodyPr wrap="square" rtlCol="0">
+            <a:spAutoFit/>
           </a:bodyPr>
-          <a:lstStyle>
-            <a:lvl1pPr marL="342900" indent="-342900" algn="l" defTabSz="914400" rtl="0" eaLnBrk="1" latinLnBrk="0" hangingPunct="1">
-              <a:spcBef>
-                <a:spcPct val="20000"/>
-              </a:spcBef>
-              <a:buFont typeface="Arial" pitchFamily="34" charset="0"/>
-              <a:buChar char="•"/>
-              <a:defRPr sz="3200" kern="1200">
-                <a:solidFill>
-                  <a:schemeClr val="tx1"/>
-                </a:solidFill>
-                <a:latin typeface="+mn-lt"/>
-                <a:ea typeface="+mn-ea"/>
-                <a:cs typeface="+mn-cs"/>
-              </a:defRPr>
-            </a:lvl1pPr>
-            <a:lvl2pPr marL="742950" indent="-285750" algn="l" defTabSz="914400" rtl="0" eaLnBrk="1" latinLnBrk="0" hangingPunct="1">
-              <a:spcBef>
-                <a:spcPct val="20000"/>
-              </a:spcBef>
-              <a:buFont typeface="Arial" pitchFamily="34" charset="0"/>
-              <a:buChar char="–"/>
-              <a:defRPr sz="2800" kern="1200">
-                <a:solidFill>
-                  <a:schemeClr val="tx1"/>
-                </a:solidFill>
-                <a:latin typeface="+mn-lt"/>
-                <a:ea typeface="+mn-ea"/>
-                <a:cs typeface="+mn-cs"/>
-              </a:defRPr>
-            </a:lvl2pPr>
-            <a:lvl3pPr marL="1143000" indent="-228600" algn="l" defTabSz="914400" rtl="0" eaLnBrk="1" latinLnBrk="0" hangingPunct="1">
-              <a:spcBef>
-                <a:spcPct val="20000"/>
-              </a:spcBef>
-              <a:buFont typeface="Arial" pitchFamily="34" charset="0"/>
-              <a:buChar char="•"/>
-              <a:defRPr sz="2400" kern="1200">
-                <a:solidFill>
-                  <a:schemeClr val="tx1"/>
-                </a:solidFill>
-                <a:latin typeface="+mn-lt"/>
-                <a:ea typeface="+mn-ea"/>
-                <a:cs typeface="+mn-cs"/>
-              </a:defRPr>
-            </a:lvl3pPr>
-            <a:lvl4pPr marL="1600200" indent="-228600" algn="l" defTabSz="914400" rtl="0" eaLnBrk="1" latinLnBrk="0" hangingPunct="1">
-              <a:spcBef>
-                <a:spcPct val="20000"/>
-              </a:spcBef>
-              <a:buFont typeface="Arial" pitchFamily="34" charset="0"/>
-              <a:buChar char="–"/>
-              <a:defRPr sz="2000" kern="1200">
-                <a:solidFill>
-                  <a:schemeClr val="tx1"/>
-                </a:solidFill>
-                <a:latin typeface="+mn-lt"/>
-                <a:ea typeface="+mn-ea"/>
-                <a:cs typeface="+mn-cs"/>
-              </a:defRPr>
-            </a:lvl4pPr>
-            <a:lvl5pPr marL="2057400" indent="-228600" algn="l" defTabSz="914400" rtl="0" eaLnBrk="1" latinLnBrk="0" hangingPunct="1">
-              <a:spcBef>
-                <a:spcPct val="20000"/>
-              </a:spcBef>
-              <a:buFont typeface="Arial" pitchFamily="34" charset="0"/>
-              <a:buChar char="»"/>
-              <a:defRPr sz="2000" kern="1200">
-                <a:solidFill>
-                  <a:schemeClr val="tx1"/>
-                </a:solidFill>
-                <a:latin typeface="+mn-lt"/>
-                <a:ea typeface="+mn-ea"/>
-                <a:cs typeface="+mn-cs"/>
-              </a:defRPr>
-            </a:lvl5pPr>
-            <a:lvl6pPr marL="2514600" indent="-228600" algn="l" defTabSz="914400" rtl="0" eaLnBrk="1" latinLnBrk="0" hangingPunct="1">
-              <a:spcBef>
-                <a:spcPct val="20000"/>
-              </a:spcBef>
-              <a:buFont typeface="Arial" pitchFamily="34" charset="0"/>
-              <a:buChar char="•"/>
-              <a:defRPr sz="2000" kern="1200">
-                <a:solidFill>
-                  <a:schemeClr val="tx1"/>
-                </a:solidFill>
-                <a:latin typeface="+mn-lt"/>
-                <a:ea typeface="+mn-ea"/>
-                <a:cs typeface="+mn-cs"/>
-              </a:defRPr>
-            </a:lvl6pPr>
-            <a:lvl7pPr marL="2971800" indent="-228600" algn="l" defTabSz="914400" rtl="0" eaLnBrk="1" latinLnBrk="0" hangingPunct="1">
-              <a:spcBef>
-                <a:spcPct val="20000"/>
-              </a:spcBef>
-              <a:buFont typeface="Arial" pitchFamily="34" charset="0"/>
-              <a:buChar char="•"/>
-              <a:defRPr sz="2000" kern="1200">
-                <a:solidFill>
-                  <a:schemeClr val="tx1"/>
-                </a:solidFill>
-                <a:latin typeface="+mn-lt"/>
-                <a:ea typeface="+mn-ea"/>
-                <a:cs typeface="+mn-cs"/>
-              </a:defRPr>
-            </a:lvl7pPr>
-            <a:lvl8pPr marL="3429000" indent="-228600" algn="l" defTabSz="914400" rtl="0" eaLnBrk="1" latinLnBrk="0" hangingPunct="1">
-              <a:spcBef>
-                <a:spcPct val="20000"/>
-              </a:spcBef>
-              <a:buFont typeface="Arial" pitchFamily="34" charset="0"/>
-              <a:buChar char="•"/>
-              <a:defRPr sz="2000" kern="1200">
-                <a:solidFill>
-                  <a:schemeClr val="tx1"/>
-                </a:solidFill>
-                <a:latin typeface="+mn-lt"/>
-                <a:ea typeface="+mn-ea"/>
-                <a:cs typeface="+mn-cs"/>
-              </a:defRPr>
-            </a:lvl8pPr>
-            <a:lvl9pPr marL="3886200" indent="-228600" algn="l" defTabSz="914400" rtl="0" eaLnBrk="1" latinLnBrk="0" hangingPunct="1">
-              <a:spcBef>
-                <a:spcPct val="20000"/>
-              </a:spcBef>
-              <a:buFont typeface="Arial" pitchFamily="34" charset="0"/>
-              <a:buChar char="•"/>
-              <a:defRPr sz="2000" kern="1200">
-                <a:solidFill>
-                  <a:schemeClr val="tx1"/>
-                </a:solidFill>
-                <a:latin typeface="+mn-lt"/>
-                <a:ea typeface="+mn-ea"/>
-                <a:cs typeface="+mn-cs"/>
-              </a:defRPr>
-            </a:lvl9pPr>
-          </a:lstStyle>
-          <a:p>
-            <a:r>
-              <a:rPr lang="en-GB" dirty="0" smtClean="0"/>
-              <a:t>Slow </a:t>
-            </a:r>
-            <a:r>
-              <a:rPr lang="en-GB" b="1" dirty="0" smtClean="0"/>
-              <a:t>pixel loop</a:t>
-            </a:r>
-            <a:r>
-              <a:rPr lang="en-GB" dirty="0" smtClean="0"/>
-              <a:t> implementation</a:t>
-            </a:r>
-            <a:endParaRPr lang="en-GB" dirty="0"/>
+          <a:lstStyle/>
+          <a:p>
+            <a:r>
+              <a:rPr lang="en-GB" sz="1200" dirty="0" smtClean="0"/>
+              <a:t>Nucleus</a:t>
+            </a:r>
+            <a:endParaRPr lang="en-GB" sz="1200" dirty="0"/>
+          </a:p>
+        </p:txBody>
+      </p:sp>
+      <p:grpSp>
+        <p:nvGrpSpPr>
+          <p:cNvPr id="31" name="Group 30"/>
+          <p:cNvGrpSpPr/>
+          <p:nvPr/>
+        </p:nvGrpSpPr>
+        <p:grpSpPr>
+          <a:xfrm>
+            <a:off x="6228184" y="4437112"/>
+            <a:ext cx="648072" cy="648072"/>
+            <a:chOff x="5940152" y="2204864"/>
+            <a:chExt cx="648072" cy="648072"/>
+          </a:xfrm>
+        </p:grpSpPr>
+        <p:sp>
+          <p:nvSpPr>
+            <p:cNvPr id="32" name="Oval 31"/>
+            <p:cNvSpPr/>
+            <p:nvPr/>
+          </p:nvSpPr>
+          <p:spPr>
+            <a:xfrm>
+              <a:off x="5940152" y="2204864"/>
+              <a:ext cx="648072" cy="648072"/>
+            </a:xfrm>
+            <a:prstGeom prst="ellipse">
+              <a:avLst/>
+            </a:prstGeom>
+            <a:noFill/>
+            <a:ln>
+              <a:solidFill>
+                <a:schemeClr val="accent2"/>
+              </a:solidFill>
+            </a:ln>
+          </p:spPr>
+          <p:style>
+            <a:lnRef idx="2">
+              <a:schemeClr val="accent1">
+                <a:shade val="50000"/>
+              </a:schemeClr>
+            </a:lnRef>
+            <a:fillRef idx="1">
+              <a:schemeClr val="accent1"/>
+            </a:fillRef>
+            <a:effectRef idx="0">
+              <a:schemeClr val="accent1"/>
+            </a:effectRef>
+            <a:fontRef idx="minor">
+              <a:schemeClr val="lt1"/>
+            </a:fontRef>
+          </p:style>
+          <p:txBody>
+            <a:bodyPr rtlCol="0" anchor="ctr"/>
+            <a:lstStyle/>
+            <a:p>
+              <a:pPr algn="ctr"/>
+              <a:endParaRPr lang="en-GB"/>
+            </a:p>
+          </p:txBody>
+        </p:sp>
+        <p:sp>
+          <p:nvSpPr>
+            <p:cNvPr id="33" name="Multiply 32"/>
+            <p:cNvSpPr/>
+            <p:nvPr/>
+          </p:nvSpPr>
+          <p:spPr>
+            <a:xfrm>
+              <a:off x="6156176" y="2420888"/>
+              <a:ext cx="216024" cy="216024"/>
+            </a:xfrm>
+            <a:prstGeom prst="mathMultiply">
+              <a:avLst/>
+            </a:prstGeom>
+            <a:solidFill>
+              <a:schemeClr val="accent2"/>
+            </a:solidFill>
+            <a:ln>
+              <a:solidFill>
+                <a:schemeClr val="accent2"/>
+              </a:solidFill>
+            </a:ln>
+          </p:spPr>
+          <p:style>
+            <a:lnRef idx="2">
+              <a:schemeClr val="accent1">
+                <a:shade val="50000"/>
+              </a:schemeClr>
+            </a:lnRef>
+            <a:fillRef idx="1">
+              <a:schemeClr val="accent1"/>
+            </a:fillRef>
+            <a:effectRef idx="0">
+              <a:schemeClr val="accent1"/>
+            </a:effectRef>
+            <a:fontRef idx="minor">
+              <a:schemeClr val="lt1"/>
+            </a:fontRef>
+          </p:style>
+          <p:txBody>
+            <a:bodyPr rtlCol="0" anchor="ctr"/>
+            <a:lstStyle/>
+            <a:p>
+              <a:pPr algn="ctr"/>
+              <a:endParaRPr lang="en-GB"/>
+            </a:p>
+          </p:txBody>
+        </p:sp>
+      </p:grpSp>
+      <p:sp>
+        <p:nvSpPr>
+          <p:cNvPr id="34" name="Oval 33"/>
+          <p:cNvSpPr/>
+          <p:nvPr/>
+        </p:nvSpPr>
+        <p:spPr>
+          <a:xfrm>
+            <a:off x="6372200" y="4653136"/>
+            <a:ext cx="216024" cy="216024"/>
+          </a:xfrm>
+          <a:prstGeom prst="ellipse">
+            <a:avLst/>
+          </a:prstGeom>
+          <a:noFill/>
+          <a:ln>
+            <a:solidFill>
+              <a:schemeClr val="accent3"/>
+            </a:solidFill>
+          </a:ln>
+        </p:spPr>
+        <p:style>
+          <a:lnRef idx="2">
+            <a:schemeClr val="accent1">
+              <a:shade val="50000"/>
+            </a:schemeClr>
+          </a:lnRef>
+          <a:fillRef idx="1">
+            <a:schemeClr val="accent1"/>
+          </a:fillRef>
+          <a:effectRef idx="0">
+            <a:schemeClr val="accent1"/>
+          </a:effectRef>
+          <a:fontRef idx="minor">
+            <a:schemeClr val="lt1"/>
+          </a:fontRef>
+        </p:style>
+        <p:txBody>
+          <a:bodyPr rtlCol="0" anchor="ctr"/>
+          <a:lstStyle/>
+          <a:p>
+            <a:pPr algn="ctr"/>
+            <a:endParaRPr lang="en-GB"/>
           </a:p>
         </p:txBody>
       </p:sp>
     </p:spTree>
-    <p:extLst>
-      <p:ext uri="{BB962C8B-B14F-4D97-AF65-F5344CB8AC3E}">
-        <p14:creationId xmlns:p14="http://schemas.microsoft.com/office/powerpoint/2010/main" xmlns="" val="4186463740"/>
-      </p:ext>
-    </p:extLst>
   </p:cSld>
   <p:clrMapOvr>
     <a:masterClrMapping/>
   </p:clrMapOvr>
-  <p:timing>
-    <p:tnLst>
-      <p:par>
-        <p:cTn id="1" dur="indefinite" restart="never" nodeType="tmRoot"/>
-      </p:par>
-    </p:tnLst>
-  </p:timing>
 </p:sld>
 </file>
 
@@ -5463,7 +6942,7 @@
           <a:p>
             <a:r>
               <a:rPr lang="en-GB" dirty="0" smtClean="0"/>
-              <a:t>Implementation – Achievements</a:t>
+              <a:t>Theory – Edge Direction</a:t>
             </a:r>
             <a:endParaRPr lang="en-GB" dirty="0"/>
           </a:p>
@@ -5476,7 +6955,7 @@
             <a:spLocks noGrp="1"/>
           </p:cNvSpPr>
           <p:nvPr>
-            <p:ph idx="1"/>
+            <p:ph sz="half" idx="1"/>
           </p:nvPr>
         </p:nvSpPr>
         <p:spPr/>
@@ -5486,37 +6965,38 @@
           <a:p>
             <a:r>
               <a:rPr lang="en-GB" dirty="0" smtClean="0"/>
-              <a:t>Took </a:t>
-            </a:r>
-            <a:r>
-              <a:rPr lang="en-GB" b="1" dirty="0" smtClean="0"/>
-              <a:t>iterative</a:t>
-            </a:r>
-            <a:r>
-              <a:rPr lang="en-GB" dirty="0" smtClean="0"/>
-              <a:t> approach to implementation</a:t>
-            </a:r>
+              <a:t>“Intra-pixel” edge</a:t>
+            </a:r>
+          </a:p>
+          <a:p>
             <a:endParaRPr lang="en-GB" dirty="0"/>
           </a:p>
         </p:txBody>
       </p:sp>
+      <p:sp>
+        <p:nvSpPr>
+          <p:cNvPr id="4" name="Content Placeholder 3"/>
+          <p:cNvSpPr>
+            <a:spLocks noGrp="1"/>
+          </p:cNvSpPr>
+          <p:nvPr>
+            <p:ph sz="half" idx="2"/>
+          </p:nvPr>
+        </p:nvSpPr>
+        <p:spPr/>
+        <p:txBody>
+          <a:bodyPr/>
+          <a:lstStyle/>
+          <a:p>
+            <a:endParaRPr lang="en-GB" dirty="0"/>
+          </a:p>
+        </p:txBody>
+      </p:sp>
     </p:spTree>
-    <p:extLst>
-      <p:ext uri="{BB962C8B-B14F-4D97-AF65-F5344CB8AC3E}">
-        <p14:creationId xmlns:p14="http://schemas.microsoft.com/office/powerpoint/2010/main" xmlns="" val="1216218812"/>
-      </p:ext>
-    </p:extLst>
   </p:cSld>
   <p:clrMapOvr>
     <a:masterClrMapping/>
   </p:clrMapOvr>
-  <p:timing>
-    <p:tnLst>
-      <p:par>
-        <p:cTn id="1" dur="indefinite" restart="never" nodeType="tmRoot"/>
-      </p:par>
-    </p:tnLst>
-  </p:timing>
 </p:sld>
 </file>
 
@@ -5544,7 +7024,7 @@
             <a:spLocks noGrp="1"/>
           </p:cNvSpPr>
           <p:nvPr>
-            <p:ph type="title"/>
+            <p:ph type="ctrTitle"/>
           </p:nvPr>
         </p:nvSpPr>
         <p:spPr/>
@@ -5554,7 +7034,7 @@
           <a:p>
             <a:r>
               <a:rPr lang="en-GB" dirty="0" smtClean="0"/>
-              <a:t>Implementation – Achievements</a:t>
+              <a:t>Implementation</a:t>
             </a:r>
             <a:endParaRPr lang="en-GB" dirty="0"/>
           </a:p>
@@ -5562,12 +7042,12 @@
       </p:sp>
       <p:sp>
         <p:nvSpPr>
-          <p:cNvPr id="3" name="Content Placeholder 2"/>
-          <p:cNvSpPr>
-            <a:spLocks noGrp="1"/>
-          </p:cNvSpPr>
-          <p:nvPr>
-            <p:ph idx="1"/>
+          <p:cNvPr id="4" name="Subtitle 3"/>
+          <p:cNvSpPr>
+            <a:spLocks noGrp="1"/>
+          </p:cNvSpPr>
+          <p:nvPr>
+            <p:ph type="subTitle" idx="1"/>
           </p:nvPr>
         </p:nvSpPr>
         <p:spPr/>
@@ -5575,95 +7055,14 @@
           <a:bodyPr/>
           <a:lstStyle/>
           <a:p>
-            <a:pPr marL="514350" indent="-514350">
-              <a:buFont typeface="+mj-lt"/>
-              <a:buAutoNum type="arabicPeriod"/>
-            </a:pPr>
-            <a:r>
-              <a:rPr lang="en-GB" dirty="0" smtClean="0"/>
-              <a:t>Implementation with </a:t>
-            </a:r>
-            <a:r>
-              <a:rPr lang="en-GB" b="1" dirty="0" smtClean="0"/>
-              <a:t>square mask </a:t>
-            </a:r>
-            <a:r>
-              <a:rPr lang="en-GB" dirty="0" smtClean="0"/>
-              <a:t>and </a:t>
-            </a:r>
-            <a:r>
-              <a:rPr lang="en-GB" b="1" dirty="0" smtClean="0"/>
-              <a:t>simple</a:t>
-            </a:r>
-            <a:r>
-              <a:rPr lang="en-GB" dirty="0" smtClean="0"/>
-              <a:t>  </a:t>
-            </a:r>
-            <a:r>
-              <a:rPr lang="en-GB" b="1" dirty="0" smtClean="0"/>
-              <a:t>similarity equation</a:t>
-            </a:r>
-            <a:endParaRPr lang="en-GB" dirty="0" smtClean="0"/>
-          </a:p>
-          <a:p>
-            <a:pPr marL="971550" lvl="1" indent="-514350">
-              <a:buFont typeface="+mj-lt"/>
-              <a:buAutoNum type="arabicPeriod"/>
-            </a:pPr>
-            <a:endParaRPr lang="en-GB" dirty="0" smtClean="0"/>
-          </a:p>
-          <a:p>
-            <a:pPr marL="971550" lvl="1" indent="-514350">
-              <a:buFont typeface="+mj-lt"/>
-              <a:buAutoNum type="arabicPeriod"/>
-            </a:pPr>
-            <a:endParaRPr lang="en-GB" dirty="0"/>
-          </a:p>
-        </p:txBody>
-      </p:sp>
-      <p:pic>
-        <p:nvPicPr>
-          <p:cNvPr id="2050" name="Picture 2" descr="H:\susanedge\susanedge\figures\simple_square_susan_test.png"/>
-          <p:cNvPicPr>
-            <a:picLocks noChangeAspect="1" noChangeArrowheads="1"/>
-          </p:cNvPicPr>
-          <p:nvPr/>
-        </p:nvPicPr>
-        <p:blipFill rotWithShape="1">
-          <a:blip r:embed="rId2" cstate="print">
-            <a:extLst>
-              <a:ext uri="{28A0092B-C50C-407E-A947-70E740481C1C}">
-                <a14:useLocalDpi xmlns:a14="http://schemas.microsoft.com/office/drawing/2010/main" xmlns="" val="0"/>
-              </a:ext>
-            </a:extLst>
-          </a:blip>
-          <a:srcRect l="28643" t="7158" r="27869" b="6235"/>
-          <a:stretch/>
-        </p:blipFill>
-        <p:spPr bwMode="auto">
-          <a:xfrm>
-            <a:off x="2699792" y="2676252"/>
-            <a:ext cx="3798350" cy="3805932"/>
-          </a:xfrm>
-          <a:prstGeom prst="rect">
-            <a:avLst/>
-          </a:prstGeom>
-          <a:noFill/>
-          <a:extLst>
-            <a:ext uri="{909E8E84-426E-40DD-AFC4-6F175D3DCCD1}">
-              <a14:hiddenFill xmlns:a14="http://schemas.microsoft.com/office/drawing/2010/main" xmlns="">
-                <a:solidFill>
-                  <a:srgbClr val="FFFFFF"/>
-                </a:solidFill>
-              </a14:hiddenFill>
-            </a:ext>
-          </a:extLst>
-        </p:spPr>
-      </p:pic>
+            <a:endParaRPr lang="en-GB"/>
+          </a:p>
+        </p:txBody>
+      </p:sp>
     </p:spTree>
     <p:extLst>
       <p:ext uri="{BB962C8B-B14F-4D97-AF65-F5344CB8AC3E}">
-        <p14:creationId xmlns:p14="http://schemas.microsoft.com/office/powerpoint/2010/main" xmlns="" val="1537013682"/>
+        <p14:creationId xmlns="" xmlns:p14="http://schemas.microsoft.com/office/powerpoint/2010/main" val="2813178390"/>
       </p:ext>
     </p:extLst>
   </p:cSld>

</xml_diff>